<commit_message>
Update Hash Encoding presentation file
</commit_message>
<xml_diff>
--- a/My Note and Practice/Text to Numerical Data Conversion/Categorical(Text to Numeric) data conversion-CTtN/Nominal Data/CTNtN3. Hash Encoding/Hash Encoding.pptx
+++ b/My Note and Practice/Text to Numerical Data Conversion/Categorical(Text to Numeric) data conversion-CTtN/Nominal Data/CTNtN3. Hash Encoding/Hash Encoding.pptx
@@ -6,14 +6,13 @@
   </p:sldMasterIdLst>
   <p:sldIdLst>
     <p:sldId id="322" r:id="rId2"/>
-    <p:sldId id="323" r:id="rId3"/>
-    <p:sldId id="324" r:id="rId4"/>
-    <p:sldId id="325" r:id="rId5"/>
-    <p:sldId id="329" r:id="rId6"/>
-    <p:sldId id="326" r:id="rId7"/>
-    <p:sldId id="335" r:id="rId8"/>
-    <p:sldId id="327" r:id="rId9"/>
-    <p:sldId id="328" r:id="rId10"/>
+    <p:sldId id="326" r:id="rId3"/>
+    <p:sldId id="335" r:id="rId4"/>
+    <p:sldId id="323" r:id="rId5"/>
+    <p:sldId id="324" r:id="rId6"/>
+    <p:sldId id="325" r:id="rId7"/>
+    <p:sldId id="329" r:id="rId8"/>
+    <p:sldId id="328" r:id="rId9"/>
   </p:sldIdLst>
   <p:sldSz cx="12192000" cy="6858000"/>
   <p:notesSz cx="6858000" cy="9144000"/>
@@ -889,7 +888,7 @@
         <a:lstStyle/>
         <a:p>
           <a:r>
-            <a:rPr lang="en-US"/>
+            <a:rPr lang="en-US" dirty="0"/>
             <a:t>Take the text</a:t>
           </a:r>
         </a:p>
@@ -2019,7 +2018,7 @@
             <a:buNone/>
           </a:pPr>
           <a:r>
-            <a:rPr lang="en-US" sz="2600" kern="1200"/>
+            <a:rPr lang="en-US" sz="2600" kern="1200" dirty="0"/>
             <a:t>Take the text</a:t>
           </a:r>
         </a:p>
@@ -4864,7 +4863,7 @@
           <a:p>
             <a:fld id="{3493752B-1F48-49E5-A31F-3906341B6897}" type="datetimeFigureOut">
               <a:rPr lang="en-US" smtClean="0"/>
-              <a:t>11/16/2025</a:t>
+              <a:t>11/17/2025</a:t>
             </a:fld>
             <a:endParaRPr lang="en-US"/>
           </a:p>
@@ -5062,7 +5061,7 @@
           <a:p>
             <a:fld id="{3493752B-1F48-49E5-A31F-3906341B6897}" type="datetimeFigureOut">
               <a:rPr lang="en-US" smtClean="0"/>
-              <a:t>11/16/2025</a:t>
+              <a:t>11/17/2025</a:t>
             </a:fld>
             <a:endParaRPr lang="en-US"/>
           </a:p>
@@ -5270,7 +5269,7 @@
           <a:p>
             <a:fld id="{3493752B-1F48-49E5-A31F-3906341B6897}" type="datetimeFigureOut">
               <a:rPr lang="en-US" smtClean="0"/>
-              <a:t>11/16/2025</a:t>
+              <a:t>11/17/2025</a:t>
             </a:fld>
             <a:endParaRPr lang="en-US"/>
           </a:p>
@@ -5468,7 +5467,7 @@
           <a:p>
             <a:fld id="{3493752B-1F48-49E5-A31F-3906341B6897}" type="datetimeFigureOut">
               <a:rPr lang="en-US" smtClean="0"/>
-              <a:t>11/16/2025</a:t>
+              <a:t>11/17/2025</a:t>
             </a:fld>
             <a:endParaRPr lang="en-US"/>
           </a:p>
@@ -5743,7 +5742,7 @@
           <a:p>
             <a:fld id="{3493752B-1F48-49E5-A31F-3906341B6897}" type="datetimeFigureOut">
               <a:rPr lang="en-US" smtClean="0"/>
-              <a:t>11/16/2025</a:t>
+              <a:t>11/17/2025</a:t>
             </a:fld>
             <a:endParaRPr lang="en-US"/>
           </a:p>
@@ -6008,7 +6007,7 @@
           <a:p>
             <a:fld id="{3493752B-1F48-49E5-A31F-3906341B6897}" type="datetimeFigureOut">
               <a:rPr lang="en-US" smtClean="0"/>
-              <a:t>11/16/2025</a:t>
+              <a:t>11/17/2025</a:t>
             </a:fld>
             <a:endParaRPr lang="en-US"/>
           </a:p>
@@ -6420,7 +6419,7 @@
           <a:p>
             <a:fld id="{3493752B-1F48-49E5-A31F-3906341B6897}" type="datetimeFigureOut">
               <a:rPr lang="en-US" smtClean="0"/>
-              <a:t>11/16/2025</a:t>
+              <a:t>11/17/2025</a:t>
             </a:fld>
             <a:endParaRPr lang="en-US"/>
           </a:p>
@@ -6561,7 +6560,7 @@
           <a:p>
             <a:fld id="{3493752B-1F48-49E5-A31F-3906341B6897}" type="datetimeFigureOut">
               <a:rPr lang="en-US" smtClean="0"/>
-              <a:t>11/16/2025</a:t>
+              <a:t>11/17/2025</a:t>
             </a:fld>
             <a:endParaRPr lang="en-US"/>
           </a:p>
@@ -6674,7 +6673,7 @@
           <a:p>
             <a:fld id="{3493752B-1F48-49E5-A31F-3906341B6897}" type="datetimeFigureOut">
               <a:rPr lang="en-US" smtClean="0"/>
-              <a:t>11/16/2025</a:t>
+              <a:t>11/17/2025</a:t>
             </a:fld>
             <a:endParaRPr lang="en-US"/>
           </a:p>
@@ -6985,7 +6984,7 @@
           <a:p>
             <a:fld id="{3493752B-1F48-49E5-A31F-3906341B6897}" type="datetimeFigureOut">
               <a:rPr lang="en-US" smtClean="0"/>
-              <a:t>11/16/2025</a:t>
+              <a:t>11/17/2025</a:t>
             </a:fld>
             <a:endParaRPr lang="en-US"/>
           </a:p>
@@ -7273,7 +7272,7 @@
           <a:p>
             <a:fld id="{3493752B-1F48-49E5-A31F-3906341B6897}" type="datetimeFigureOut">
               <a:rPr lang="en-US" smtClean="0"/>
-              <a:t>11/16/2025</a:t>
+              <a:t>11/17/2025</a:t>
             </a:fld>
             <a:endParaRPr lang="en-US"/>
           </a:p>
@@ -7514,7 +7513,7 @@
           <a:p>
             <a:fld id="{3493752B-1F48-49E5-A31F-3906341B6897}" type="datetimeFigureOut">
               <a:rPr lang="en-US" smtClean="0"/>
-              <a:t>11/16/2025</a:t>
+              <a:t>11/17/2025</a:t>
             </a:fld>
             <a:endParaRPr lang="en-US"/>
           </a:p>
@@ -8046,14 +8045,17 @@
               <a:t>fixed number of columns (</a:t>
             </a:r>
             <a:r>
-              <a:rPr lang="en-US" sz="2400" b="1"/>
-              <a:t>n_features)</a:t>
-            </a:r>
-            <a:r>
-              <a:rPr lang="en-US" sz="2400"/>
+              <a:rPr lang="en-US" sz="2400" b="1" dirty="0" err="1"/>
+              <a:t>n_features</a:t>
+            </a:r>
+            <a:r>
+              <a:rPr lang="en-US" sz="2400" b="1" dirty="0"/>
+              <a:t>)</a:t>
+            </a:r>
+            <a:r>
+              <a:rPr lang="en-US" sz="2400" dirty="0"/>
               <a:t>.</a:t>
             </a:r>
-            <a:endParaRPr lang="en-US" sz="2400" dirty="0"/>
           </a:p>
           <a:p>
             <a:pPr marL="0" indent="0">
@@ -8076,14 +8078,15 @@
             </a:endParaRPr>
           </a:p>
           <a:p>
-            <a:pPr marL="0" indent="0">
-              <a:buNone/>
-            </a:pPr>
-            <a:endParaRPr lang="en-US" sz="2400" dirty="0">
-              <a:latin typeface="Open Sans" pitchFamily="2" charset="0"/>
-              <a:ea typeface="Open Sans" pitchFamily="2" charset="0"/>
-              <a:cs typeface="Open Sans" pitchFamily="2" charset="0"/>
-            </a:endParaRPr>
+            <a:pPr lvl="1"/>
+            <a:r>
+              <a:rPr lang="en-US" dirty="0">
+                <a:latin typeface="Open Sans" pitchFamily="2" charset="0"/>
+                <a:ea typeface="Open Sans" pitchFamily="2" charset="0"/>
+                <a:cs typeface="Open Sans" pitchFamily="2" charset="0"/>
+              </a:rPr>
+              <a:t>It is used for Nominal date.</a:t>
+            </a:r>
           </a:p>
         </p:txBody>
       </p:sp>
@@ -8152,1230 +8155,6 @@
 </file>
 
 <file path=ppt/slides/slide2.xml><?xml version="1.0" encoding="utf-8"?>
-<p:sld xmlns:a="http://schemas.openxmlformats.org/drawingml/2006/main" xmlns:r="http://schemas.openxmlformats.org/officeDocument/2006/relationships" xmlns:p="http://schemas.openxmlformats.org/presentationml/2006/main">
-  <p:cSld>
-    <p:spTree>
-      <p:nvGrpSpPr>
-        <p:cNvPr id="1" name="">
-          <a:extLst>
-            <a:ext uri="{FF2B5EF4-FFF2-40B4-BE49-F238E27FC236}">
-              <a16:creationId xmlns:a16="http://schemas.microsoft.com/office/drawing/2014/main" id="{F42B4ED1-80B1-E3D2-E4D8-53003FC7B4D8}"/>
-            </a:ext>
-          </a:extLst>
-        </p:cNvPr>
-        <p:cNvGrpSpPr/>
-        <p:nvPr/>
-      </p:nvGrpSpPr>
-      <p:grpSpPr>
-        <a:xfrm>
-          <a:off x="0" y="0"/>
-          <a:ext cx="0" cy="0"/>
-          <a:chOff x="0" y="0"/>
-          <a:chExt cx="0" cy="0"/>
-        </a:xfrm>
-      </p:grpSpPr>
-      <p:sp>
-        <p:nvSpPr>
-          <p:cNvPr id="2" name="Title 1">
-            <a:extLst>
-              <a:ext uri="{FF2B5EF4-FFF2-40B4-BE49-F238E27FC236}">
-                <a16:creationId xmlns:a16="http://schemas.microsoft.com/office/drawing/2014/main" id="{7158FC6E-4FF4-8883-59D3-916374C9A32E}"/>
-              </a:ext>
-            </a:extLst>
-          </p:cNvPr>
-          <p:cNvSpPr>
-            <a:spLocks noGrp="1"/>
-          </p:cNvSpPr>
-          <p:nvPr>
-            <p:ph type="title"/>
-          </p:nvPr>
-        </p:nvSpPr>
-        <p:spPr>
-          <a:xfrm>
-            <a:off x="838200" y="365125"/>
-            <a:ext cx="10515600" cy="640080"/>
-          </a:xfrm>
-        </p:spPr>
-        <p:txBody>
-          <a:bodyPr>
-            <a:normAutofit/>
-          </a:bodyPr>
-          <a:lstStyle/>
-          <a:p>
-            <a:pPr algn="ctr"/>
-            <a:r>
-              <a:rPr lang="en-US" sz="3600" dirty="0">
-                <a:latin typeface="Bebas Neue" panose="020B0606020202050201" pitchFamily="34" charset="0"/>
-              </a:rPr>
-              <a:t>Importance of hash encoding</a:t>
-            </a:r>
-          </a:p>
-        </p:txBody>
-      </p:sp>
-      <p:sp>
-        <p:nvSpPr>
-          <p:cNvPr id="3" name="Content Placeholder 2">
-            <a:extLst>
-              <a:ext uri="{FF2B5EF4-FFF2-40B4-BE49-F238E27FC236}">
-                <a16:creationId xmlns:a16="http://schemas.microsoft.com/office/drawing/2014/main" id="{E649F298-9A65-EA9A-EE2C-BD6762BCFEBE}"/>
-              </a:ext>
-            </a:extLst>
-          </p:cNvPr>
-          <p:cNvSpPr>
-            <a:spLocks noGrp="1"/>
-          </p:cNvSpPr>
-          <p:nvPr>
-            <p:ph idx="1"/>
-          </p:nvPr>
-        </p:nvSpPr>
-        <p:spPr>
-          <a:xfrm>
-            <a:off x="838200" y="1091381"/>
-            <a:ext cx="10515600" cy="5085582"/>
-          </a:xfrm>
-        </p:spPr>
-        <p:txBody>
-          <a:bodyPr>
-            <a:normAutofit/>
-          </a:bodyPr>
-          <a:lstStyle/>
-          <a:p>
-            <a:pPr marL="457200" indent="-457200">
-              <a:buFont typeface="+mj-lt"/>
-              <a:buAutoNum type="arabicPeriod"/>
-            </a:pPr>
-            <a:r>
-              <a:rPr lang="en-US" sz="2400" b="1" dirty="0">
-                <a:latin typeface="Open Sans" pitchFamily="2" charset="0"/>
-                <a:ea typeface="Open Sans" pitchFamily="2" charset="0"/>
-                <a:cs typeface="Open Sans" pitchFamily="2" charset="0"/>
-              </a:rPr>
-              <a:t>Handles Millions of Categories Easily</a:t>
-            </a:r>
-          </a:p>
-          <a:p>
-            <a:pPr lvl="1"/>
-            <a:r>
-              <a:rPr lang="en-US" sz="2200" dirty="0">
-                <a:latin typeface="Open Sans" pitchFamily="2" charset="0"/>
-                <a:ea typeface="Open Sans" pitchFamily="2" charset="0"/>
-                <a:cs typeface="Open Sans" pitchFamily="2" charset="0"/>
-              </a:rPr>
-              <a:t>If you have </a:t>
-            </a:r>
-            <a:r>
-              <a:rPr lang="en-US" sz="2200" b="1" dirty="0">
-                <a:latin typeface="Open Sans" pitchFamily="2" charset="0"/>
-                <a:ea typeface="Open Sans" pitchFamily="2" charset="0"/>
-                <a:cs typeface="Open Sans" pitchFamily="2" charset="0"/>
-              </a:rPr>
-              <a:t>huge cardinality</a:t>
-            </a:r>
-            <a:r>
-              <a:rPr lang="en-US" sz="2200" dirty="0">
-                <a:latin typeface="Open Sans" pitchFamily="2" charset="0"/>
-                <a:ea typeface="Open Sans" pitchFamily="2" charset="0"/>
-                <a:cs typeface="Open Sans" pitchFamily="2" charset="0"/>
-              </a:rPr>
-              <a:t>:</a:t>
-            </a:r>
-          </a:p>
-          <a:p>
-            <a:pPr lvl="1"/>
-            <a:r>
-              <a:rPr lang="en-US" sz="2200" dirty="0">
-                <a:latin typeface="Open Sans" pitchFamily="2" charset="0"/>
-                <a:ea typeface="Open Sans" pitchFamily="2" charset="0"/>
-                <a:cs typeface="Open Sans" pitchFamily="2" charset="0"/>
-              </a:rPr>
-              <a:t>50,000 product names</a:t>
-            </a:r>
-          </a:p>
-          <a:p>
-            <a:pPr lvl="1"/>
-            <a:r>
-              <a:rPr lang="en-US" sz="2200" dirty="0">
-                <a:latin typeface="Open Sans" pitchFamily="2" charset="0"/>
-                <a:ea typeface="Open Sans" pitchFamily="2" charset="0"/>
-                <a:cs typeface="Open Sans" pitchFamily="2" charset="0"/>
-              </a:rPr>
-              <a:t>200,000 job titles</a:t>
-            </a:r>
-          </a:p>
-          <a:p>
-            <a:pPr lvl="1"/>
-            <a:r>
-              <a:rPr lang="en-US" sz="2200" dirty="0">
-                <a:latin typeface="Open Sans" pitchFamily="2" charset="0"/>
-                <a:ea typeface="Open Sans" pitchFamily="2" charset="0"/>
-                <a:cs typeface="Open Sans" pitchFamily="2" charset="0"/>
-              </a:rPr>
-              <a:t>1 million </a:t>
-            </a:r>
-            <a:r>
-              <a:rPr lang="en-US" sz="2200" dirty="0" err="1">
-                <a:latin typeface="Open Sans" pitchFamily="2" charset="0"/>
-                <a:ea typeface="Open Sans" pitchFamily="2" charset="0"/>
-                <a:cs typeface="Open Sans" pitchFamily="2" charset="0"/>
-              </a:rPr>
-              <a:t>user_ids</a:t>
-            </a:r>
-            <a:endParaRPr lang="en-US" sz="2200" dirty="0">
-              <a:latin typeface="Open Sans" pitchFamily="2" charset="0"/>
-              <a:ea typeface="Open Sans" pitchFamily="2" charset="0"/>
-              <a:cs typeface="Open Sans" pitchFamily="2" charset="0"/>
-            </a:endParaRPr>
-          </a:p>
-          <a:p>
-            <a:pPr lvl="1"/>
-            <a:r>
-              <a:rPr lang="en-US" sz="2200" dirty="0">
-                <a:latin typeface="Open Sans" pitchFamily="2" charset="0"/>
-                <a:ea typeface="Open Sans" pitchFamily="2" charset="0"/>
-                <a:cs typeface="Open Sans" pitchFamily="2" charset="0"/>
-              </a:rPr>
-              <a:t>all words in a text corpus</a:t>
-            </a:r>
-          </a:p>
-          <a:p>
-            <a:pPr marL="0" indent="0">
-              <a:buNone/>
-            </a:pPr>
-            <a:r>
-              <a:rPr lang="en-US" sz="2400" dirty="0">
-                <a:latin typeface="Open Sans" pitchFamily="2" charset="0"/>
-                <a:ea typeface="Open Sans" pitchFamily="2" charset="0"/>
-                <a:cs typeface="Open Sans" pitchFamily="2" charset="0"/>
-              </a:rPr>
-              <a:t>👉 One-hot encoding </a:t>
-            </a:r>
-            <a:r>
-              <a:rPr lang="en-US" sz="2400" b="1" dirty="0">
-                <a:latin typeface="Open Sans" pitchFamily="2" charset="0"/>
-                <a:ea typeface="Open Sans" pitchFamily="2" charset="0"/>
-                <a:cs typeface="Open Sans" pitchFamily="2" charset="0"/>
-              </a:rPr>
-              <a:t>explodes</a:t>
-            </a:r>
-            <a:r>
-              <a:rPr lang="en-US" sz="2400" dirty="0">
-                <a:latin typeface="Open Sans" pitchFamily="2" charset="0"/>
-                <a:ea typeface="Open Sans" pitchFamily="2" charset="0"/>
-                <a:cs typeface="Open Sans" pitchFamily="2" charset="0"/>
-              </a:rPr>
-              <a:t> into thousands of columns.</a:t>
-            </a:r>
-            <a:br>
-              <a:rPr lang="en-US" sz="2400" dirty="0">
-                <a:latin typeface="Open Sans" pitchFamily="2" charset="0"/>
-                <a:ea typeface="Open Sans" pitchFamily="2" charset="0"/>
-                <a:cs typeface="Open Sans" pitchFamily="2" charset="0"/>
-              </a:rPr>
-            </a:br>
-            <a:r>
-              <a:rPr lang="en-US" sz="2400" dirty="0">
-                <a:latin typeface="Open Sans" pitchFamily="2" charset="0"/>
-                <a:ea typeface="Open Sans" pitchFamily="2" charset="0"/>
-                <a:cs typeface="Open Sans" pitchFamily="2" charset="0"/>
-              </a:rPr>
-              <a:t>👉 Hash encoding reduces that to </a:t>
-            </a:r>
-            <a:r>
-              <a:rPr lang="en-US" sz="2400" b="1" dirty="0">
-                <a:latin typeface="Open Sans" pitchFamily="2" charset="0"/>
-                <a:ea typeface="Open Sans" pitchFamily="2" charset="0"/>
-                <a:cs typeface="Open Sans" pitchFamily="2" charset="0"/>
-              </a:rPr>
-              <a:t>fixed columns</a:t>
-            </a:r>
-            <a:r>
-              <a:rPr lang="en-US" sz="2400" dirty="0">
-                <a:latin typeface="Open Sans" pitchFamily="2" charset="0"/>
-                <a:ea typeface="Open Sans" pitchFamily="2" charset="0"/>
-                <a:cs typeface="Open Sans" pitchFamily="2" charset="0"/>
-              </a:rPr>
-              <a:t>, like 20 or 50.</a:t>
-            </a:r>
-          </a:p>
-          <a:p>
-            <a:pPr marL="0" indent="0">
-              <a:buNone/>
-            </a:pPr>
-            <a:r>
-              <a:rPr lang="en-US" sz="2400" dirty="0">
-                <a:latin typeface="Open Sans" pitchFamily="2" charset="0"/>
-                <a:ea typeface="Open Sans" pitchFamily="2" charset="0"/>
-                <a:cs typeface="Open Sans" pitchFamily="2" charset="0"/>
-              </a:rPr>
-              <a:t>  </a:t>
-            </a:r>
-          </a:p>
-          <a:p>
-            <a:pPr marL="0" indent="0">
-              <a:buNone/>
-            </a:pPr>
-            <a:r>
-              <a:rPr lang="en-US" sz="2400" b="1" dirty="0">
-                <a:latin typeface="Open Sans" pitchFamily="2" charset="0"/>
-                <a:ea typeface="Open Sans" pitchFamily="2" charset="0"/>
-                <a:cs typeface="Open Sans" pitchFamily="2" charset="0"/>
-              </a:rPr>
-              <a:t>So:</a:t>
-            </a:r>
-          </a:p>
-          <a:p>
-            <a:pPr lvl="1"/>
-            <a:r>
-              <a:rPr lang="en-US" sz="2200" dirty="0">
-                <a:latin typeface="Open Sans" pitchFamily="2" charset="0"/>
-                <a:ea typeface="Open Sans" pitchFamily="2" charset="0"/>
-                <a:cs typeface="Open Sans" pitchFamily="2" charset="0"/>
-              </a:rPr>
-              <a:t>Hash encoding prevents your dataset from becoming huge and slow.</a:t>
-            </a:r>
-          </a:p>
-          <a:p>
-            <a:pPr marL="0" indent="0">
-              <a:buNone/>
-            </a:pPr>
-            <a:endParaRPr lang="en-US" sz="2400" dirty="0">
-              <a:latin typeface="Open Sans" pitchFamily="2" charset="0"/>
-              <a:ea typeface="Open Sans" pitchFamily="2" charset="0"/>
-              <a:cs typeface="Open Sans" pitchFamily="2" charset="0"/>
-            </a:endParaRPr>
-          </a:p>
-        </p:txBody>
-      </p:sp>
-    </p:spTree>
-    <p:extLst>
-      <p:ext uri="{BB962C8B-B14F-4D97-AF65-F5344CB8AC3E}">
-        <p14:creationId xmlns:p14="http://schemas.microsoft.com/office/powerpoint/2010/main" val="3839561771"/>
-      </p:ext>
-    </p:extLst>
-  </p:cSld>
-  <p:clrMapOvr>
-    <a:masterClrMapping/>
-  </p:clrMapOvr>
-</p:sld>
-</file>
-
-<file path=ppt/slides/slide3.xml><?xml version="1.0" encoding="utf-8"?>
-<p:sld xmlns:a="http://schemas.openxmlformats.org/drawingml/2006/main" xmlns:r="http://schemas.openxmlformats.org/officeDocument/2006/relationships" xmlns:p="http://schemas.openxmlformats.org/presentationml/2006/main">
-  <p:cSld>
-    <p:spTree>
-      <p:nvGrpSpPr>
-        <p:cNvPr id="1" name="">
-          <a:extLst>
-            <a:ext uri="{FF2B5EF4-FFF2-40B4-BE49-F238E27FC236}">
-              <a16:creationId xmlns:a16="http://schemas.microsoft.com/office/drawing/2014/main" id="{7DBB6F7A-FEE6-9266-E7BF-B45BE1C61E7E}"/>
-            </a:ext>
-          </a:extLst>
-        </p:cNvPr>
-        <p:cNvGrpSpPr/>
-        <p:nvPr/>
-      </p:nvGrpSpPr>
-      <p:grpSpPr>
-        <a:xfrm>
-          <a:off x="0" y="0"/>
-          <a:ext cx="0" cy="0"/>
-          <a:chOff x="0" y="0"/>
-          <a:chExt cx="0" cy="0"/>
-        </a:xfrm>
-      </p:grpSpPr>
-      <p:sp>
-        <p:nvSpPr>
-          <p:cNvPr id="2" name="Title 1">
-            <a:extLst>
-              <a:ext uri="{FF2B5EF4-FFF2-40B4-BE49-F238E27FC236}">
-                <a16:creationId xmlns:a16="http://schemas.microsoft.com/office/drawing/2014/main" id="{36E00391-C2DD-6522-7FD4-E874D7B189C3}"/>
-              </a:ext>
-            </a:extLst>
-          </p:cNvPr>
-          <p:cNvSpPr>
-            <a:spLocks noGrp="1"/>
-          </p:cNvSpPr>
-          <p:nvPr>
-            <p:ph type="title"/>
-          </p:nvPr>
-        </p:nvSpPr>
-        <p:spPr>
-          <a:xfrm>
-            <a:off x="838200" y="365125"/>
-            <a:ext cx="10515600" cy="640080"/>
-          </a:xfrm>
-        </p:spPr>
-        <p:txBody>
-          <a:bodyPr>
-            <a:normAutofit/>
-          </a:bodyPr>
-          <a:lstStyle/>
-          <a:p>
-            <a:pPr algn="ctr"/>
-            <a:r>
-              <a:rPr lang="en-US" sz="3600" dirty="0">
-                <a:latin typeface="Bebas Neue" panose="020B0606020202050201" pitchFamily="34" charset="0"/>
-              </a:rPr>
-              <a:t>Importance of hash encoding</a:t>
-            </a:r>
-          </a:p>
-        </p:txBody>
-      </p:sp>
-      <p:sp>
-        <p:nvSpPr>
-          <p:cNvPr id="3" name="Content Placeholder 2">
-            <a:extLst>
-              <a:ext uri="{FF2B5EF4-FFF2-40B4-BE49-F238E27FC236}">
-                <a16:creationId xmlns:a16="http://schemas.microsoft.com/office/drawing/2014/main" id="{E110BAD7-D991-03D7-2F67-EDAA70E6FFFA}"/>
-              </a:ext>
-            </a:extLst>
-          </p:cNvPr>
-          <p:cNvSpPr>
-            <a:spLocks noGrp="1"/>
-          </p:cNvSpPr>
-          <p:nvPr>
-            <p:ph idx="1"/>
-          </p:nvPr>
-        </p:nvSpPr>
-        <p:spPr>
-          <a:xfrm>
-            <a:off x="838200" y="1091381"/>
-            <a:ext cx="10515600" cy="5085582"/>
-          </a:xfrm>
-        </p:spPr>
-        <p:txBody>
-          <a:bodyPr>
-            <a:noAutofit/>
-          </a:bodyPr>
-          <a:lstStyle/>
-          <a:p>
-            <a:pPr marL="457200" indent="-457200">
-              <a:buFont typeface="+mj-lt"/>
-              <a:buAutoNum type="arabicPeriod" startAt="2"/>
-            </a:pPr>
-            <a:r>
-              <a:rPr lang="en-US" sz="2400" b="1" dirty="0">
-                <a:latin typeface="Open Sans" pitchFamily="2" charset="0"/>
-                <a:ea typeface="Open Sans" pitchFamily="2" charset="0"/>
-                <a:cs typeface="Open Sans" pitchFamily="2" charset="0"/>
-              </a:rPr>
-              <a:t>No Need to “fit” — Good for Unseen/New Categories</a:t>
-            </a:r>
-          </a:p>
-          <a:p>
-            <a:pPr marL="0" indent="0">
-              <a:buNone/>
-            </a:pPr>
-            <a:r>
-              <a:rPr lang="en-US" sz="2600" dirty="0">
-                <a:latin typeface="Open Sans" pitchFamily="2" charset="0"/>
-                <a:ea typeface="Open Sans" pitchFamily="2" charset="0"/>
-                <a:cs typeface="Open Sans" pitchFamily="2" charset="0"/>
-              </a:rPr>
-              <a:t>Important point:</a:t>
-            </a:r>
-          </a:p>
-          <a:p>
-            <a:pPr marL="457200" lvl="1" indent="0">
-              <a:buNone/>
-            </a:pPr>
-            <a:r>
-              <a:rPr lang="en-US" sz="2200" b="1" dirty="0">
-                <a:latin typeface="Open Sans" pitchFamily="2" charset="0"/>
-                <a:ea typeface="Open Sans" pitchFamily="2" charset="0"/>
-                <a:cs typeface="Open Sans" pitchFamily="2" charset="0"/>
-              </a:rPr>
-              <a:t>✔ One-hot / Label / Binary need fitting</a:t>
-            </a:r>
-          </a:p>
-          <a:p>
-            <a:pPr marL="457200" lvl="1" indent="0">
-              <a:buNone/>
-            </a:pPr>
-            <a:r>
-              <a:rPr lang="en-US" sz="2200" dirty="0">
-                <a:latin typeface="Open Sans" pitchFamily="2" charset="0"/>
-                <a:ea typeface="Open Sans" pitchFamily="2" charset="0"/>
-                <a:cs typeface="Open Sans" pitchFamily="2" charset="0"/>
-              </a:rPr>
-              <a:t>You must know </a:t>
-            </a:r>
-            <a:r>
-              <a:rPr lang="en-US" sz="2200" b="1" dirty="0">
-                <a:latin typeface="Open Sans" pitchFamily="2" charset="0"/>
-                <a:ea typeface="Open Sans" pitchFamily="2" charset="0"/>
-                <a:cs typeface="Open Sans" pitchFamily="2" charset="0"/>
-              </a:rPr>
-              <a:t>all categories in advance</a:t>
-            </a:r>
-            <a:r>
-              <a:rPr lang="en-US" sz="2200" dirty="0">
-                <a:latin typeface="Open Sans" pitchFamily="2" charset="0"/>
-                <a:ea typeface="Open Sans" pitchFamily="2" charset="0"/>
-                <a:cs typeface="Open Sans" pitchFamily="2" charset="0"/>
-              </a:rPr>
-              <a:t>.</a:t>
-            </a:r>
-          </a:p>
-          <a:p>
-            <a:pPr marL="457200" lvl="1" indent="0">
-              <a:buNone/>
-            </a:pPr>
-            <a:r>
-              <a:rPr lang="en-US" sz="2200" b="1" dirty="0">
-                <a:latin typeface="Open Sans" pitchFamily="2" charset="0"/>
-                <a:ea typeface="Open Sans" pitchFamily="2" charset="0"/>
-                <a:cs typeface="Open Sans" pitchFamily="2" charset="0"/>
-              </a:rPr>
-              <a:t>✔ Hash Encoding does NOT need fitting</a:t>
-            </a:r>
-          </a:p>
-          <a:p>
-            <a:pPr marL="457200" lvl="1" indent="0">
-              <a:buNone/>
-            </a:pPr>
-            <a:r>
-              <a:rPr lang="en-US" sz="2200" dirty="0">
-                <a:latin typeface="Open Sans" pitchFamily="2" charset="0"/>
-                <a:ea typeface="Open Sans" pitchFamily="2" charset="0"/>
-                <a:cs typeface="Open Sans" pitchFamily="2" charset="0"/>
-              </a:rPr>
-              <a:t>New categories? No problem.</a:t>
-            </a:r>
-          </a:p>
-          <a:p>
-            <a:pPr marL="0" indent="0">
-              <a:buNone/>
-            </a:pPr>
-            <a:endParaRPr lang="en-US" sz="2400" dirty="0">
-              <a:latin typeface="Open Sans" pitchFamily="2" charset="0"/>
-              <a:ea typeface="Open Sans" pitchFamily="2" charset="0"/>
-              <a:cs typeface="Open Sans" pitchFamily="2" charset="0"/>
-            </a:endParaRPr>
-          </a:p>
-          <a:p>
-            <a:pPr marL="0" indent="0">
-              <a:buNone/>
-            </a:pPr>
-            <a:r>
-              <a:rPr lang="en-US" sz="2400" dirty="0">
-                <a:latin typeface="Open Sans" pitchFamily="2" charset="0"/>
-                <a:ea typeface="Open Sans" pitchFamily="2" charset="0"/>
-                <a:cs typeface="Open Sans" pitchFamily="2" charset="0"/>
-              </a:rPr>
-              <a:t>This is </a:t>
-            </a:r>
-            <a:r>
-              <a:rPr lang="en-US" sz="2400" b="1" dirty="0">
-                <a:latin typeface="Open Sans" pitchFamily="2" charset="0"/>
-                <a:ea typeface="Open Sans" pitchFamily="2" charset="0"/>
-                <a:cs typeface="Open Sans" pitchFamily="2" charset="0"/>
-              </a:rPr>
-              <a:t>very useful for streaming data</a:t>
-            </a:r>
-            <a:r>
-              <a:rPr lang="en-US" sz="2400" dirty="0">
-                <a:latin typeface="Open Sans" pitchFamily="2" charset="0"/>
-                <a:ea typeface="Open Sans" pitchFamily="2" charset="0"/>
-                <a:cs typeface="Open Sans" pitchFamily="2" charset="0"/>
-              </a:rPr>
-              <a:t>:</a:t>
-            </a:r>
-          </a:p>
-          <a:p>
-            <a:pPr lvl="1"/>
-            <a:r>
-              <a:rPr lang="en-US" sz="2200" dirty="0">
-                <a:latin typeface="Open Sans" pitchFamily="2" charset="0"/>
-                <a:ea typeface="Open Sans" pitchFamily="2" charset="0"/>
-                <a:cs typeface="Open Sans" pitchFamily="2" charset="0"/>
-              </a:rPr>
-              <a:t>live logs</a:t>
-            </a:r>
-          </a:p>
-          <a:p>
-            <a:pPr lvl="1"/>
-            <a:r>
-              <a:rPr lang="en-US" sz="2200" dirty="0">
-                <a:latin typeface="Open Sans" pitchFamily="2" charset="0"/>
-                <a:ea typeface="Open Sans" pitchFamily="2" charset="0"/>
-                <a:cs typeface="Open Sans" pitchFamily="2" charset="0"/>
-              </a:rPr>
-              <a:t>real-time user events</a:t>
-            </a:r>
-          </a:p>
-          <a:p>
-            <a:pPr lvl="1"/>
-            <a:r>
-              <a:rPr lang="en-US" sz="2200" dirty="0">
-                <a:latin typeface="Open Sans" pitchFamily="2" charset="0"/>
-                <a:ea typeface="Open Sans" pitchFamily="2" charset="0"/>
-                <a:cs typeface="Open Sans" pitchFamily="2" charset="0"/>
-              </a:rPr>
-              <a:t>new products being added daily</a:t>
-            </a:r>
-          </a:p>
-          <a:p>
-            <a:pPr marL="0" indent="0">
-              <a:buNone/>
-            </a:pPr>
-            <a:endParaRPr lang="en-US" sz="2400" dirty="0">
-              <a:latin typeface="Open Sans" pitchFamily="2" charset="0"/>
-              <a:ea typeface="Open Sans" pitchFamily="2" charset="0"/>
-              <a:cs typeface="Open Sans" pitchFamily="2" charset="0"/>
-            </a:endParaRPr>
-          </a:p>
-        </p:txBody>
-      </p:sp>
-      <p:sp>
-        <p:nvSpPr>
-          <p:cNvPr id="4" name="Rectangle 3">
-            <a:extLst>
-              <a:ext uri="{FF2B5EF4-FFF2-40B4-BE49-F238E27FC236}">
-                <a16:creationId xmlns:a16="http://schemas.microsoft.com/office/drawing/2014/main" id="{402D5E0E-BBD2-0522-886B-2FE932911748}"/>
-              </a:ext>
-            </a:extLst>
-          </p:cNvPr>
-          <p:cNvSpPr/>
-          <p:nvPr/>
-        </p:nvSpPr>
-        <p:spPr>
-          <a:xfrm>
-            <a:off x="7167282" y="1976718"/>
-            <a:ext cx="3751729" cy="1191295"/>
-          </a:xfrm>
-          <a:prstGeom prst="rect">
-            <a:avLst/>
-          </a:prstGeom>
-        </p:spPr>
-        <p:style>
-          <a:lnRef idx="1">
-            <a:schemeClr val="accent5"/>
-          </a:lnRef>
-          <a:fillRef idx="3">
-            <a:schemeClr val="accent5"/>
-          </a:fillRef>
-          <a:effectRef idx="2">
-            <a:schemeClr val="accent5"/>
-          </a:effectRef>
-          <a:fontRef idx="minor">
-            <a:schemeClr val="lt1"/>
-          </a:fontRef>
-        </p:style>
-        <p:txBody>
-          <a:bodyPr rtlCol="0" anchor="ctr"/>
-          <a:lstStyle/>
-          <a:p>
-            <a:r>
-              <a:rPr lang="en-US" sz="2200" dirty="0">
-                <a:latin typeface="Open Sans" pitchFamily="2" charset="0"/>
-                <a:ea typeface="Open Sans" pitchFamily="2" charset="0"/>
-                <a:cs typeface="Open Sans" pitchFamily="2" charset="0"/>
-              </a:rPr>
-              <a:t>"dragonfruit" → hashed</a:t>
-            </a:r>
-          </a:p>
-          <a:p>
-            <a:r>
-              <a:rPr lang="en-US" sz="2200" dirty="0">
-                <a:latin typeface="Open Sans" pitchFamily="2" charset="0"/>
-                <a:ea typeface="Open Sans" pitchFamily="2" charset="0"/>
-                <a:cs typeface="Open Sans" pitchFamily="2" charset="0"/>
-              </a:rPr>
-              <a:t>"kiwi"        → hashed</a:t>
-            </a:r>
-          </a:p>
-          <a:p>
-            <a:r>
-              <a:rPr lang="en-US" sz="2200" dirty="0">
-                <a:latin typeface="Open Sans" pitchFamily="2" charset="0"/>
-                <a:ea typeface="Open Sans" pitchFamily="2" charset="0"/>
-                <a:cs typeface="Open Sans" pitchFamily="2" charset="0"/>
-              </a:rPr>
-              <a:t>"unknown123"  → hashed</a:t>
-            </a:r>
-            <a:endParaRPr lang="en-US" sz="2200" dirty="0">
-              <a:effectLst/>
-              <a:latin typeface="Open Sans" pitchFamily="2" charset="0"/>
-              <a:ea typeface="Open Sans" pitchFamily="2" charset="0"/>
-              <a:cs typeface="Open Sans" pitchFamily="2" charset="0"/>
-            </a:endParaRPr>
-          </a:p>
-        </p:txBody>
-      </p:sp>
-      <p:sp>
-        <p:nvSpPr>
-          <p:cNvPr id="5" name="Rectangle 4">
-            <a:extLst>
-              <a:ext uri="{FF2B5EF4-FFF2-40B4-BE49-F238E27FC236}">
-                <a16:creationId xmlns:a16="http://schemas.microsoft.com/office/drawing/2014/main" id="{95EF0798-971A-E1DF-08CC-1CFBA3AE9A7D}"/>
-              </a:ext>
-            </a:extLst>
-          </p:cNvPr>
-          <p:cNvSpPr/>
-          <p:nvPr/>
-        </p:nvSpPr>
-        <p:spPr>
-          <a:xfrm>
-            <a:off x="7167282" y="3168013"/>
-            <a:ext cx="3751729" cy="799160"/>
-          </a:xfrm>
-          <a:prstGeom prst="rect">
-            <a:avLst/>
-          </a:prstGeom>
-        </p:spPr>
-        <p:style>
-          <a:lnRef idx="2">
-            <a:schemeClr val="accent1"/>
-          </a:lnRef>
-          <a:fillRef idx="1">
-            <a:schemeClr val="lt1"/>
-          </a:fillRef>
-          <a:effectRef idx="0">
-            <a:schemeClr val="accent1"/>
-          </a:effectRef>
-          <a:fontRef idx="minor">
-            <a:schemeClr val="dk1"/>
-          </a:fontRef>
-        </p:style>
-        <p:txBody>
-          <a:bodyPr rtlCol="0" anchor="ctr"/>
-          <a:lstStyle/>
-          <a:p>
-            <a:r>
-              <a:rPr lang="en-US" sz="2200" dirty="0">
-                <a:latin typeface="Open Sans" pitchFamily="2" charset="0"/>
-                <a:ea typeface="Open Sans" pitchFamily="2" charset="0"/>
-                <a:cs typeface="Open Sans" pitchFamily="2" charset="0"/>
-              </a:rPr>
-              <a:t>No errors. No refit. No update.</a:t>
-            </a:r>
-          </a:p>
-        </p:txBody>
-      </p:sp>
-    </p:spTree>
-    <p:extLst>
-      <p:ext uri="{BB962C8B-B14F-4D97-AF65-F5344CB8AC3E}">
-        <p14:creationId xmlns:p14="http://schemas.microsoft.com/office/powerpoint/2010/main" val="41421681"/>
-      </p:ext>
-    </p:extLst>
-  </p:cSld>
-  <p:clrMapOvr>
-    <a:masterClrMapping/>
-  </p:clrMapOvr>
-</p:sld>
-</file>
-
-<file path=ppt/slides/slide4.xml><?xml version="1.0" encoding="utf-8"?>
-<p:sld xmlns:a="http://schemas.openxmlformats.org/drawingml/2006/main" xmlns:r="http://schemas.openxmlformats.org/officeDocument/2006/relationships" xmlns:p="http://schemas.openxmlformats.org/presentationml/2006/main">
-  <p:cSld>
-    <p:spTree>
-      <p:nvGrpSpPr>
-        <p:cNvPr id="1" name="">
-          <a:extLst>
-            <a:ext uri="{FF2B5EF4-FFF2-40B4-BE49-F238E27FC236}">
-              <a16:creationId xmlns:a16="http://schemas.microsoft.com/office/drawing/2014/main" id="{A3E6B0A9-8E92-6816-3EB2-0B15207BF6CC}"/>
-            </a:ext>
-          </a:extLst>
-        </p:cNvPr>
-        <p:cNvGrpSpPr/>
-        <p:nvPr/>
-      </p:nvGrpSpPr>
-      <p:grpSpPr>
-        <a:xfrm>
-          <a:off x="0" y="0"/>
-          <a:ext cx="0" cy="0"/>
-          <a:chOff x="0" y="0"/>
-          <a:chExt cx="0" cy="0"/>
-        </a:xfrm>
-      </p:grpSpPr>
-      <p:sp>
-        <p:nvSpPr>
-          <p:cNvPr id="2" name="Title 1">
-            <a:extLst>
-              <a:ext uri="{FF2B5EF4-FFF2-40B4-BE49-F238E27FC236}">
-                <a16:creationId xmlns:a16="http://schemas.microsoft.com/office/drawing/2014/main" id="{749785D5-4E37-6303-E57F-36CEB1E50002}"/>
-              </a:ext>
-            </a:extLst>
-          </p:cNvPr>
-          <p:cNvSpPr>
-            <a:spLocks noGrp="1"/>
-          </p:cNvSpPr>
-          <p:nvPr>
-            <p:ph type="title"/>
-          </p:nvPr>
-        </p:nvSpPr>
-        <p:spPr>
-          <a:xfrm>
-            <a:off x="838200" y="365125"/>
-            <a:ext cx="10515600" cy="640080"/>
-          </a:xfrm>
-        </p:spPr>
-        <p:txBody>
-          <a:bodyPr>
-            <a:normAutofit/>
-          </a:bodyPr>
-          <a:lstStyle/>
-          <a:p>
-            <a:pPr algn="ctr"/>
-            <a:r>
-              <a:rPr lang="en-US" sz="3600" dirty="0">
-                <a:latin typeface="Bebas Neue" panose="020B0606020202050201" pitchFamily="34" charset="0"/>
-              </a:rPr>
-              <a:t>Importance of hash encoding</a:t>
-            </a:r>
-          </a:p>
-        </p:txBody>
-      </p:sp>
-      <p:sp>
-        <p:nvSpPr>
-          <p:cNvPr id="3" name="Content Placeholder 2">
-            <a:extLst>
-              <a:ext uri="{FF2B5EF4-FFF2-40B4-BE49-F238E27FC236}">
-                <a16:creationId xmlns:a16="http://schemas.microsoft.com/office/drawing/2014/main" id="{246138B8-5C6A-E853-A761-1F6DE52AC7C9}"/>
-              </a:ext>
-            </a:extLst>
-          </p:cNvPr>
-          <p:cNvSpPr>
-            <a:spLocks noGrp="1"/>
-          </p:cNvSpPr>
-          <p:nvPr>
-            <p:ph idx="1"/>
-          </p:nvPr>
-        </p:nvSpPr>
-        <p:spPr>
-          <a:xfrm>
-            <a:off x="838200" y="1091381"/>
-            <a:ext cx="10515600" cy="5085582"/>
-          </a:xfrm>
-        </p:spPr>
-        <p:txBody>
-          <a:bodyPr>
-            <a:normAutofit/>
-          </a:bodyPr>
-          <a:lstStyle/>
-          <a:p>
-            <a:pPr marL="457200" indent="-457200">
-              <a:buFont typeface="+mj-lt"/>
-              <a:buAutoNum type="arabicPeriod" startAt="3"/>
-            </a:pPr>
-            <a:r>
-              <a:rPr lang="en-US" sz="2400" b="1" dirty="0">
-                <a:latin typeface="Open Sans" pitchFamily="2" charset="0"/>
-                <a:ea typeface="Open Sans" pitchFamily="2" charset="0"/>
-                <a:cs typeface="Open Sans" pitchFamily="2" charset="0"/>
-              </a:rPr>
-              <a:t>Saves Memory + Fast</a:t>
-            </a:r>
-          </a:p>
-          <a:p>
-            <a:pPr marL="0" indent="0">
-              <a:buNone/>
-            </a:pPr>
-            <a:r>
-              <a:rPr lang="en-US" sz="2400" dirty="0">
-                <a:latin typeface="Open Sans" pitchFamily="2" charset="0"/>
-                <a:ea typeface="Open Sans" pitchFamily="2" charset="0"/>
-                <a:cs typeface="Open Sans" pitchFamily="2" charset="0"/>
-              </a:rPr>
-              <a:t>Hash encoding does </a:t>
-            </a:r>
-            <a:r>
-              <a:rPr lang="en-US" sz="2400" b="1" dirty="0">
-                <a:latin typeface="Open Sans" pitchFamily="2" charset="0"/>
-                <a:ea typeface="Open Sans" pitchFamily="2" charset="0"/>
-                <a:cs typeface="Open Sans" pitchFamily="2" charset="0"/>
-              </a:rPr>
-              <a:t>not</a:t>
-            </a:r>
-            <a:r>
-              <a:rPr lang="en-US" sz="2400" dirty="0">
-                <a:latin typeface="Open Sans" pitchFamily="2" charset="0"/>
-                <a:ea typeface="Open Sans" pitchFamily="2" charset="0"/>
-                <a:cs typeface="Open Sans" pitchFamily="2" charset="0"/>
-              </a:rPr>
-              <a:t> store a lookup table. It uses a mathematical hash function.</a:t>
-            </a:r>
-          </a:p>
-          <a:p>
-            <a:pPr marL="0" indent="0">
-              <a:buNone/>
-            </a:pPr>
-            <a:r>
-              <a:rPr lang="en-US" sz="2400" b="1" dirty="0">
-                <a:latin typeface="Open Sans" pitchFamily="2" charset="0"/>
-                <a:ea typeface="Open Sans" pitchFamily="2" charset="0"/>
-                <a:cs typeface="Open Sans" pitchFamily="2" charset="0"/>
-              </a:rPr>
-              <a:t>This saves:</a:t>
-            </a:r>
-          </a:p>
-          <a:p>
-            <a:pPr lvl="1"/>
-            <a:r>
-              <a:rPr lang="en-US" sz="2200" dirty="0">
-                <a:latin typeface="Open Sans" pitchFamily="2" charset="0"/>
-                <a:ea typeface="Open Sans" pitchFamily="2" charset="0"/>
-                <a:cs typeface="Open Sans" pitchFamily="2" charset="0"/>
-              </a:rPr>
-              <a:t>RAM</a:t>
-            </a:r>
-          </a:p>
-          <a:p>
-            <a:pPr lvl="1"/>
-            <a:r>
-              <a:rPr lang="en-US" sz="2200" dirty="0">
-                <a:latin typeface="Open Sans" pitchFamily="2" charset="0"/>
-                <a:ea typeface="Open Sans" pitchFamily="2" charset="0"/>
-                <a:cs typeface="Open Sans" pitchFamily="2" charset="0"/>
-              </a:rPr>
-              <a:t>storage</a:t>
-            </a:r>
-          </a:p>
-          <a:p>
-            <a:pPr lvl="1"/>
-            <a:r>
-              <a:rPr lang="en-US" sz="2200" dirty="0">
-                <a:latin typeface="Open Sans" pitchFamily="2" charset="0"/>
-                <a:ea typeface="Open Sans" pitchFamily="2" charset="0"/>
-                <a:cs typeface="Open Sans" pitchFamily="2" charset="0"/>
-              </a:rPr>
-              <a:t>time</a:t>
-            </a:r>
-          </a:p>
-          <a:p>
-            <a:pPr marL="0" indent="0">
-              <a:buNone/>
-            </a:pPr>
-            <a:r>
-              <a:rPr lang="en-US" sz="2400" dirty="0">
-                <a:latin typeface="Open Sans" pitchFamily="2" charset="0"/>
-                <a:ea typeface="Open Sans" pitchFamily="2" charset="0"/>
-                <a:cs typeface="Open Sans" pitchFamily="2" charset="0"/>
-              </a:rPr>
-              <a:t>And because column count stays small, models train </a:t>
-            </a:r>
-            <a:r>
-              <a:rPr lang="en-US" sz="2400" b="1" dirty="0">
-                <a:latin typeface="Open Sans" pitchFamily="2" charset="0"/>
-                <a:ea typeface="Open Sans" pitchFamily="2" charset="0"/>
-                <a:cs typeface="Open Sans" pitchFamily="2" charset="0"/>
-              </a:rPr>
-              <a:t>much faster</a:t>
-            </a:r>
-            <a:r>
-              <a:rPr lang="en-US" sz="2400" dirty="0">
-                <a:latin typeface="Open Sans" pitchFamily="2" charset="0"/>
-                <a:ea typeface="Open Sans" pitchFamily="2" charset="0"/>
-                <a:cs typeface="Open Sans" pitchFamily="2" charset="0"/>
-              </a:rPr>
-              <a:t>.</a:t>
-            </a:r>
-          </a:p>
-          <a:p>
-            <a:pPr marL="0" indent="0">
-              <a:buNone/>
-            </a:pPr>
-            <a:endParaRPr lang="en-US" sz="2400" dirty="0">
-              <a:latin typeface="Open Sans" pitchFamily="2" charset="0"/>
-              <a:ea typeface="Open Sans" pitchFamily="2" charset="0"/>
-              <a:cs typeface="Open Sans" pitchFamily="2" charset="0"/>
-            </a:endParaRPr>
-          </a:p>
-        </p:txBody>
-      </p:sp>
-    </p:spTree>
-    <p:extLst>
-      <p:ext uri="{BB962C8B-B14F-4D97-AF65-F5344CB8AC3E}">
-        <p14:creationId xmlns:p14="http://schemas.microsoft.com/office/powerpoint/2010/main" val="1946900617"/>
-      </p:ext>
-    </p:extLst>
-  </p:cSld>
-  <p:clrMapOvr>
-    <a:masterClrMapping/>
-  </p:clrMapOvr>
-</p:sld>
-</file>
-
-<file path=ppt/slides/slide5.xml><?xml version="1.0" encoding="utf-8"?>
-<p:sld xmlns:a="http://schemas.openxmlformats.org/drawingml/2006/main" xmlns:r="http://schemas.openxmlformats.org/officeDocument/2006/relationships" xmlns:p="http://schemas.openxmlformats.org/presentationml/2006/main">
-  <p:cSld>
-    <p:spTree>
-      <p:nvGrpSpPr>
-        <p:cNvPr id="1" name="">
-          <a:extLst>
-            <a:ext uri="{FF2B5EF4-FFF2-40B4-BE49-F238E27FC236}">
-              <a16:creationId xmlns:a16="http://schemas.microsoft.com/office/drawing/2014/main" id="{5C042334-0CF6-2B36-F9FA-E3588B094FD7}"/>
-            </a:ext>
-          </a:extLst>
-        </p:cNvPr>
-        <p:cNvGrpSpPr/>
-        <p:nvPr/>
-      </p:nvGrpSpPr>
-      <p:grpSpPr>
-        <a:xfrm>
-          <a:off x="0" y="0"/>
-          <a:ext cx="0" cy="0"/>
-          <a:chOff x="0" y="0"/>
-          <a:chExt cx="0" cy="0"/>
-        </a:xfrm>
-      </p:grpSpPr>
-      <p:sp>
-        <p:nvSpPr>
-          <p:cNvPr id="2" name="Title 1">
-            <a:extLst>
-              <a:ext uri="{FF2B5EF4-FFF2-40B4-BE49-F238E27FC236}">
-                <a16:creationId xmlns:a16="http://schemas.microsoft.com/office/drawing/2014/main" id="{60EE7321-F965-DF72-917D-87042A627436}"/>
-              </a:ext>
-            </a:extLst>
-          </p:cNvPr>
-          <p:cNvSpPr>
-            <a:spLocks noGrp="1"/>
-          </p:cNvSpPr>
-          <p:nvPr>
-            <p:ph type="title"/>
-          </p:nvPr>
-        </p:nvSpPr>
-        <p:spPr>
-          <a:xfrm>
-            <a:off x="838200" y="365125"/>
-            <a:ext cx="10515600" cy="640080"/>
-          </a:xfrm>
-        </p:spPr>
-        <p:txBody>
-          <a:bodyPr>
-            <a:normAutofit/>
-          </a:bodyPr>
-          <a:lstStyle/>
-          <a:p>
-            <a:pPr algn="ctr"/>
-            <a:r>
-              <a:rPr lang="en-US" sz="3600" dirty="0">
-                <a:latin typeface="Bebas Neue" panose="020B0606020202050201" pitchFamily="34" charset="0"/>
-              </a:rPr>
-              <a:t>Importance of hash encoding</a:t>
-            </a:r>
-          </a:p>
-        </p:txBody>
-      </p:sp>
-      <p:sp>
-        <p:nvSpPr>
-          <p:cNvPr id="3" name="Content Placeholder 2">
-            <a:extLst>
-              <a:ext uri="{FF2B5EF4-FFF2-40B4-BE49-F238E27FC236}">
-                <a16:creationId xmlns:a16="http://schemas.microsoft.com/office/drawing/2014/main" id="{12E7334B-60AF-1204-6FC7-48BD740096D7}"/>
-              </a:ext>
-            </a:extLst>
-          </p:cNvPr>
-          <p:cNvSpPr>
-            <a:spLocks noGrp="1"/>
-          </p:cNvSpPr>
-          <p:nvPr>
-            <p:ph idx="1"/>
-          </p:nvPr>
-        </p:nvSpPr>
-        <p:spPr>
-          <a:xfrm>
-            <a:off x="838200" y="1091381"/>
-            <a:ext cx="10515600" cy="5085582"/>
-          </a:xfrm>
-        </p:spPr>
-        <p:txBody>
-          <a:bodyPr>
-            <a:normAutofit lnSpcReduction="10000"/>
-          </a:bodyPr>
-          <a:lstStyle/>
-          <a:p>
-            <a:pPr marL="457200" indent="-457200">
-              <a:buFont typeface="+mj-lt"/>
-              <a:buAutoNum type="arabicPeriod" startAt="4"/>
-            </a:pPr>
-            <a:r>
-              <a:rPr lang="en-US" sz="2400" b="1" dirty="0">
-                <a:latin typeface="Open Sans" pitchFamily="2" charset="0"/>
-                <a:ea typeface="Open Sans" pitchFamily="2" charset="0"/>
-                <a:cs typeface="Open Sans" pitchFamily="2" charset="0"/>
-              </a:rPr>
-              <a:t>Reduces Multicollinearity (better than One-Hot)</a:t>
-            </a:r>
-          </a:p>
-          <a:p>
-            <a:pPr marL="0" indent="0">
-              <a:buNone/>
-            </a:pPr>
-            <a:r>
-              <a:rPr lang="en-US" sz="2400" dirty="0">
-                <a:latin typeface="Open Sans" pitchFamily="2" charset="0"/>
-                <a:ea typeface="Open Sans" pitchFamily="2" charset="0"/>
-                <a:cs typeface="Open Sans" pitchFamily="2" charset="0"/>
-              </a:rPr>
-              <a:t>One-hot encoding creates </a:t>
-            </a:r>
-            <a:r>
-              <a:rPr lang="en-US" sz="2400" b="1" dirty="0">
-                <a:latin typeface="Open Sans" pitchFamily="2" charset="0"/>
-                <a:ea typeface="Open Sans" pitchFamily="2" charset="0"/>
-                <a:cs typeface="Open Sans" pitchFamily="2" charset="0"/>
-              </a:rPr>
-              <a:t>highly correlated</a:t>
-            </a:r>
-            <a:r>
-              <a:rPr lang="en-US" sz="2400" dirty="0">
-                <a:latin typeface="Open Sans" pitchFamily="2" charset="0"/>
-                <a:ea typeface="Open Sans" pitchFamily="2" charset="0"/>
-                <a:cs typeface="Open Sans" pitchFamily="2" charset="0"/>
-              </a:rPr>
-              <a:t> dummy columns.</a:t>
-            </a:r>
-          </a:p>
-          <a:p>
-            <a:pPr marL="0" indent="0">
-              <a:buNone/>
-            </a:pPr>
-            <a:r>
-              <a:rPr lang="en-US" sz="2400" b="1" dirty="0">
-                <a:latin typeface="Open Sans" pitchFamily="2" charset="0"/>
-                <a:ea typeface="Open Sans" pitchFamily="2" charset="0"/>
-                <a:cs typeface="Open Sans" pitchFamily="2" charset="0"/>
-              </a:rPr>
-              <a:t>Hash encoding:</a:t>
-            </a:r>
-          </a:p>
-          <a:p>
-            <a:pPr lvl="1"/>
-            <a:r>
-              <a:rPr lang="en-US" sz="2200" dirty="0">
-                <a:latin typeface="Open Sans" pitchFamily="2" charset="0"/>
-                <a:ea typeface="Open Sans" pitchFamily="2" charset="0"/>
-                <a:cs typeface="Open Sans" pitchFamily="2" charset="0"/>
-              </a:rPr>
-              <a:t>spreads categories across multiple columns</a:t>
-            </a:r>
-          </a:p>
-          <a:p>
-            <a:pPr lvl="1"/>
-            <a:r>
-              <a:rPr lang="en-US" sz="2200" dirty="0">
-                <a:latin typeface="Open Sans" pitchFamily="2" charset="0"/>
-                <a:ea typeface="Open Sans" pitchFamily="2" charset="0"/>
-                <a:cs typeface="Open Sans" pitchFamily="2" charset="0"/>
-              </a:rPr>
-              <a:t>collisions and ±1 signs reduce correlation</a:t>
-            </a:r>
-          </a:p>
-          <a:p>
-            <a:pPr lvl="1"/>
-            <a:r>
-              <a:rPr lang="en-US" sz="2200" dirty="0">
-                <a:latin typeface="Open Sans" pitchFamily="2" charset="0"/>
-                <a:ea typeface="Open Sans" pitchFamily="2" charset="0"/>
-                <a:cs typeface="Open Sans" pitchFamily="2" charset="0"/>
-              </a:rPr>
-              <a:t>reduces overfitting risk</a:t>
-            </a:r>
-          </a:p>
-          <a:p>
-            <a:pPr marL="0" indent="0">
-              <a:buNone/>
-            </a:pPr>
-            <a:r>
-              <a:rPr lang="en-US" sz="2400" b="1" dirty="0">
-                <a:latin typeface="Open Sans" pitchFamily="2" charset="0"/>
-                <a:ea typeface="Open Sans" pitchFamily="2" charset="0"/>
-                <a:cs typeface="Open Sans" pitchFamily="2" charset="0"/>
-              </a:rPr>
-              <a:t>This makes some models happier:</a:t>
-            </a:r>
-          </a:p>
-          <a:p>
-            <a:pPr lvl="1"/>
-            <a:r>
-              <a:rPr lang="en-US" sz="2200" dirty="0">
-                <a:latin typeface="Open Sans" pitchFamily="2" charset="0"/>
-                <a:ea typeface="Open Sans" pitchFamily="2" charset="0"/>
-                <a:cs typeface="Open Sans" pitchFamily="2" charset="0"/>
-              </a:rPr>
-              <a:t>Logistic Regression</a:t>
-            </a:r>
-          </a:p>
-          <a:p>
-            <a:pPr lvl="1"/>
-            <a:r>
-              <a:rPr lang="en-US" sz="2200" dirty="0">
-                <a:latin typeface="Open Sans" pitchFamily="2" charset="0"/>
-                <a:ea typeface="Open Sans" pitchFamily="2" charset="0"/>
-                <a:cs typeface="Open Sans" pitchFamily="2" charset="0"/>
-              </a:rPr>
-              <a:t>Linear Regression</a:t>
-            </a:r>
-          </a:p>
-          <a:p>
-            <a:pPr lvl="1"/>
-            <a:r>
-              <a:rPr lang="en-US" sz="2200" dirty="0" err="1">
-                <a:latin typeface="Open Sans" pitchFamily="2" charset="0"/>
-                <a:ea typeface="Open Sans" pitchFamily="2" charset="0"/>
-                <a:cs typeface="Open Sans" pitchFamily="2" charset="0"/>
-              </a:rPr>
-              <a:t>SVM</a:t>
-            </a:r>
-            <a:endParaRPr lang="en-US" sz="2200" dirty="0">
-              <a:latin typeface="Open Sans" pitchFamily="2" charset="0"/>
-              <a:ea typeface="Open Sans" pitchFamily="2" charset="0"/>
-              <a:cs typeface="Open Sans" pitchFamily="2" charset="0"/>
-            </a:endParaRPr>
-          </a:p>
-          <a:p>
-            <a:pPr lvl="1"/>
-            <a:endParaRPr lang="en-US" sz="2200" dirty="0">
-              <a:latin typeface="Open Sans" pitchFamily="2" charset="0"/>
-              <a:ea typeface="Open Sans" pitchFamily="2" charset="0"/>
-              <a:cs typeface="Open Sans" pitchFamily="2" charset="0"/>
-            </a:endParaRPr>
-          </a:p>
-          <a:p>
-            <a:pPr marL="0" indent="0">
-              <a:buNone/>
-            </a:pPr>
-            <a:r>
-              <a:rPr lang="en-US" sz="2400" b="1" dirty="0">
-                <a:latin typeface="Open Sans" pitchFamily="2" charset="0"/>
-                <a:ea typeface="Open Sans" pitchFamily="2" charset="0"/>
-                <a:cs typeface="Open Sans" pitchFamily="2" charset="0"/>
-              </a:rPr>
-              <a:t>In one line, Hash Encoding is important because it makes huge categorical data manageable, fast, memory-efficient, and able to handle new categories without retraining.</a:t>
-            </a:r>
-            <a:endParaRPr lang="en-US" sz="2400" dirty="0">
-              <a:latin typeface="Open Sans" pitchFamily="2" charset="0"/>
-              <a:ea typeface="Open Sans" pitchFamily="2" charset="0"/>
-              <a:cs typeface="Open Sans" pitchFamily="2" charset="0"/>
-            </a:endParaRPr>
-          </a:p>
-          <a:p>
-            <a:pPr marL="0" indent="0">
-              <a:buNone/>
-            </a:pPr>
-            <a:endParaRPr lang="en-US" sz="2600" dirty="0">
-              <a:latin typeface="Open Sans" pitchFamily="2" charset="0"/>
-              <a:ea typeface="Open Sans" pitchFamily="2" charset="0"/>
-              <a:cs typeface="Open Sans" pitchFamily="2" charset="0"/>
-            </a:endParaRPr>
-          </a:p>
-        </p:txBody>
-      </p:sp>
-    </p:spTree>
-    <p:extLst>
-      <p:ext uri="{BB962C8B-B14F-4D97-AF65-F5344CB8AC3E}">
-        <p14:creationId xmlns:p14="http://schemas.microsoft.com/office/powerpoint/2010/main" val="2317169321"/>
-      </p:ext>
-    </p:extLst>
-  </p:cSld>
-  <p:clrMapOvr>
-    <a:masterClrMapping/>
-  </p:clrMapOvr>
-</p:sld>
-</file>
-
-<file path=ppt/slides/slide6.xml><?xml version="1.0" encoding="utf-8"?>
 <p:sld xmlns:a="http://schemas.openxmlformats.org/drawingml/2006/main" xmlns:r="http://schemas.openxmlformats.org/officeDocument/2006/relationships" xmlns:p="http://schemas.openxmlformats.org/presentationml/2006/main">
   <p:cSld>
     <p:spTree>
@@ -9432,7 +8211,7 @@
                 <a:latin typeface="Bebas Neue" panose="020B0606020202050201" pitchFamily="34" charset="0"/>
                 <a:hlinkClick r:id="rId2"/>
               </a:rPr>
-              <a:t>How hash encoding works</a:t>
+              <a:t>How hash encoding works?</a:t>
             </a:r>
             <a:endParaRPr lang="en-US" sz="3600" dirty="0">
               <a:latin typeface="Bebas Neue" panose="020B0606020202050201" pitchFamily="34" charset="0"/>
@@ -10621,7 +9400,7 @@
 </p:sld>
 </file>
 
-<file path=ppt/slides/slide7.xml><?xml version="1.0" encoding="utf-8"?>
+<file path=ppt/slides/slide3.xml><?xml version="1.0" encoding="utf-8"?>
 <p:sld xmlns:a="http://schemas.openxmlformats.org/drawingml/2006/main" xmlns:r="http://schemas.openxmlformats.org/officeDocument/2006/relationships" xmlns:p="http://schemas.openxmlformats.org/presentationml/2006/main">
   <p:cSld>
     <p:spTree>
@@ -10890,7 +9669,7 @@
 </p:sld>
 </file>
 
-<file path=ppt/slides/slide8.xml><?xml version="1.0" encoding="utf-8"?>
+<file path=ppt/slides/slide4.xml><?xml version="1.0" encoding="utf-8"?>
 <p:sld xmlns:a="http://schemas.openxmlformats.org/drawingml/2006/main" xmlns:r="http://schemas.openxmlformats.org/officeDocument/2006/relationships" xmlns:p="http://schemas.openxmlformats.org/presentationml/2006/main">
   <p:cSld>
     <p:spTree>
@@ -10898,7 +9677,7 @@
         <p:cNvPr id="1" name="">
           <a:extLst>
             <a:ext uri="{FF2B5EF4-FFF2-40B4-BE49-F238E27FC236}">
-              <a16:creationId xmlns:a16="http://schemas.microsoft.com/office/drawing/2014/main" id="{2DC74B98-6C6B-24A0-A225-FBEA7A1C027A}"/>
+              <a16:creationId xmlns:a16="http://schemas.microsoft.com/office/drawing/2014/main" id="{F42B4ED1-80B1-E3D2-E4D8-53003FC7B4D8}"/>
             </a:ext>
           </a:extLst>
         </p:cNvPr>
@@ -10918,7 +9697,7 @@
           <p:cNvPr id="2" name="Title 1">
             <a:extLst>
               <a:ext uri="{FF2B5EF4-FFF2-40B4-BE49-F238E27FC236}">
-                <a16:creationId xmlns:a16="http://schemas.microsoft.com/office/drawing/2014/main" id="{15AAAB39-2B05-D633-ACAE-8B9488675BE9}"/>
+                <a16:creationId xmlns:a16="http://schemas.microsoft.com/office/drawing/2014/main" id="{7158FC6E-4FF4-8883-59D3-916374C9A32E}"/>
               </a:ext>
             </a:extLst>
           </p:cNvPr>
@@ -10942,9 +9721,12 @@
           <a:lstStyle/>
           <a:p>
             <a:pPr algn="ctr"/>
-            <a:endParaRPr lang="en-US" sz="3600" dirty="0">
-              <a:latin typeface="Bebas Neue" panose="020B0606020202050201" pitchFamily="34" charset="0"/>
-            </a:endParaRPr>
+            <a:r>
+              <a:rPr lang="en-US" sz="3600" dirty="0">
+                <a:latin typeface="Bebas Neue" panose="020B0606020202050201" pitchFamily="34" charset="0"/>
+              </a:rPr>
+              <a:t>Importance of hash encoding</a:t>
+            </a:r>
           </a:p>
         </p:txBody>
       </p:sp>
@@ -10953,7 +9735,7 @@
           <p:cNvPr id="3" name="Content Placeholder 2">
             <a:extLst>
               <a:ext uri="{FF2B5EF4-FFF2-40B4-BE49-F238E27FC236}">
-                <a16:creationId xmlns:a16="http://schemas.microsoft.com/office/drawing/2014/main" id="{6BFE8ABC-C103-2FFA-AEDE-3F8B9DD5E6CC}"/>
+                <a16:creationId xmlns:a16="http://schemas.microsoft.com/office/drawing/2014/main" id="{E649F298-9A65-EA9A-EE2C-BD6762BCFEBE}"/>
               </a:ext>
             </a:extLst>
           </p:cNvPr>
@@ -10976,6 +9758,201 @@
           </a:bodyPr>
           <a:lstStyle/>
           <a:p>
+            <a:pPr marL="457200" indent="-457200">
+              <a:buFont typeface="+mj-lt"/>
+              <a:buAutoNum type="arabicPeriod"/>
+            </a:pPr>
+            <a:r>
+              <a:rPr lang="en-US" sz="2400" b="1" dirty="0">
+                <a:latin typeface="Open Sans" pitchFamily="2" charset="0"/>
+                <a:ea typeface="Open Sans" pitchFamily="2" charset="0"/>
+                <a:cs typeface="Open Sans" pitchFamily="2" charset="0"/>
+              </a:rPr>
+              <a:t>Handles Millions of Categories Easily</a:t>
+            </a:r>
+          </a:p>
+          <a:p>
+            <a:pPr lvl="1"/>
+            <a:r>
+              <a:rPr lang="en-US" sz="2200" dirty="0">
+                <a:latin typeface="Open Sans" pitchFamily="2" charset="0"/>
+                <a:ea typeface="Open Sans" pitchFamily="2" charset="0"/>
+                <a:cs typeface="Open Sans" pitchFamily="2" charset="0"/>
+              </a:rPr>
+              <a:t>If you have </a:t>
+            </a:r>
+            <a:r>
+              <a:rPr lang="en-US" sz="2200" b="1" dirty="0">
+                <a:latin typeface="Open Sans" pitchFamily="2" charset="0"/>
+                <a:ea typeface="Open Sans" pitchFamily="2" charset="0"/>
+                <a:cs typeface="Open Sans" pitchFamily="2" charset="0"/>
+              </a:rPr>
+              <a:t>huge cardinality</a:t>
+            </a:r>
+            <a:r>
+              <a:rPr lang="en-US" sz="2200" dirty="0">
+                <a:latin typeface="Open Sans" pitchFamily="2" charset="0"/>
+                <a:ea typeface="Open Sans" pitchFamily="2" charset="0"/>
+                <a:cs typeface="Open Sans" pitchFamily="2" charset="0"/>
+              </a:rPr>
+              <a:t>:</a:t>
+            </a:r>
+          </a:p>
+          <a:p>
+            <a:pPr lvl="1"/>
+            <a:r>
+              <a:rPr lang="en-US" sz="2200" dirty="0">
+                <a:latin typeface="Open Sans" pitchFamily="2" charset="0"/>
+                <a:ea typeface="Open Sans" pitchFamily="2" charset="0"/>
+                <a:cs typeface="Open Sans" pitchFamily="2" charset="0"/>
+              </a:rPr>
+              <a:t>50,000 product names</a:t>
+            </a:r>
+          </a:p>
+          <a:p>
+            <a:pPr lvl="1"/>
+            <a:r>
+              <a:rPr lang="en-US" sz="2200" dirty="0">
+                <a:latin typeface="Open Sans" pitchFamily="2" charset="0"/>
+                <a:ea typeface="Open Sans" pitchFamily="2" charset="0"/>
+                <a:cs typeface="Open Sans" pitchFamily="2" charset="0"/>
+              </a:rPr>
+              <a:t>200,000 job titles</a:t>
+            </a:r>
+          </a:p>
+          <a:p>
+            <a:pPr lvl="1"/>
+            <a:r>
+              <a:rPr lang="en-US" sz="2200" dirty="0">
+                <a:latin typeface="Open Sans" pitchFamily="2" charset="0"/>
+                <a:ea typeface="Open Sans" pitchFamily="2" charset="0"/>
+                <a:cs typeface="Open Sans" pitchFamily="2" charset="0"/>
+              </a:rPr>
+              <a:t>1 million </a:t>
+            </a:r>
+            <a:r>
+              <a:rPr lang="en-US" sz="2200" dirty="0" err="1">
+                <a:latin typeface="Open Sans" pitchFamily="2" charset="0"/>
+                <a:ea typeface="Open Sans" pitchFamily="2" charset="0"/>
+                <a:cs typeface="Open Sans" pitchFamily="2" charset="0"/>
+              </a:rPr>
+              <a:t>user_ids</a:t>
+            </a:r>
+            <a:endParaRPr lang="en-US" sz="2200" dirty="0">
+              <a:latin typeface="Open Sans" pitchFamily="2" charset="0"/>
+              <a:ea typeface="Open Sans" pitchFamily="2" charset="0"/>
+              <a:cs typeface="Open Sans" pitchFamily="2" charset="0"/>
+            </a:endParaRPr>
+          </a:p>
+          <a:p>
+            <a:pPr lvl="1"/>
+            <a:r>
+              <a:rPr lang="en-US" sz="2200" dirty="0">
+                <a:latin typeface="Open Sans" pitchFamily="2" charset="0"/>
+                <a:ea typeface="Open Sans" pitchFamily="2" charset="0"/>
+                <a:cs typeface="Open Sans" pitchFamily="2" charset="0"/>
+              </a:rPr>
+              <a:t>all words in a text corpus</a:t>
+            </a:r>
+          </a:p>
+          <a:p>
+            <a:pPr marL="0" indent="0">
+              <a:buNone/>
+            </a:pPr>
+            <a:r>
+              <a:rPr lang="en-US" sz="2400" dirty="0">
+                <a:latin typeface="Open Sans" pitchFamily="2" charset="0"/>
+                <a:ea typeface="Open Sans" pitchFamily="2" charset="0"/>
+                <a:cs typeface="Open Sans" pitchFamily="2" charset="0"/>
+              </a:rPr>
+              <a:t>👉 One-hot encoding </a:t>
+            </a:r>
+            <a:r>
+              <a:rPr lang="en-US" sz="2400" b="1" dirty="0">
+                <a:latin typeface="Open Sans" pitchFamily="2" charset="0"/>
+                <a:ea typeface="Open Sans" pitchFamily="2" charset="0"/>
+                <a:cs typeface="Open Sans" pitchFamily="2" charset="0"/>
+              </a:rPr>
+              <a:t>explodes</a:t>
+            </a:r>
+            <a:r>
+              <a:rPr lang="en-US" sz="2400" dirty="0">
+                <a:latin typeface="Open Sans" pitchFamily="2" charset="0"/>
+                <a:ea typeface="Open Sans" pitchFamily="2" charset="0"/>
+                <a:cs typeface="Open Sans" pitchFamily="2" charset="0"/>
+              </a:rPr>
+              <a:t> into thousands of columns.</a:t>
+            </a:r>
+            <a:br>
+              <a:rPr lang="en-US" sz="2400" dirty="0">
+                <a:latin typeface="Open Sans" pitchFamily="2" charset="0"/>
+                <a:ea typeface="Open Sans" pitchFamily="2" charset="0"/>
+                <a:cs typeface="Open Sans" pitchFamily="2" charset="0"/>
+              </a:rPr>
+            </a:br>
+            <a:r>
+              <a:rPr lang="en-US" sz="2400" dirty="0">
+                <a:latin typeface="Open Sans" pitchFamily="2" charset="0"/>
+                <a:ea typeface="Open Sans" pitchFamily="2" charset="0"/>
+                <a:cs typeface="Open Sans" pitchFamily="2" charset="0"/>
+              </a:rPr>
+              <a:t>👉 Hash encoding reduces that to </a:t>
+            </a:r>
+            <a:r>
+              <a:rPr lang="en-US" sz="2400" b="1" dirty="0">
+                <a:latin typeface="Open Sans" pitchFamily="2" charset="0"/>
+                <a:ea typeface="Open Sans" pitchFamily="2" charset="0"/>
+                <a:cs typeface="Open Sans" pitchFamily="2" charset="0"/>
+              </a:rPr>
+              <a:t>fixed columns</a:t>
+            </a:r>
+            <a:r>
+              <a:rPr lang="en-US" sz="2400" dirty="0">
+                <a:latin typeface="Open Sans" pitchFamily="2" charset="0"/>
+                <a:ea typeface="Open Sans" pitchFamily="2" charset="0"/>
+                <a:cs typeface="Open Sans" pitchFamily="2" charset="0"/>
+              </a:rPr>
+              <a:t>, like 20 or 50.</a:t>
+            </a:r>
+          </a:p>
+          <a:p>
+            <a:pPr marL="0" indent="0">
+              <a:buNone/>
+            </a:pPr>
+            <a:r>
+              <a:rPr lang="en-US" sz="2400" dirty="0">
+                <a:latin typeface="Open Sans" pitchFamily="2" charset="0"/>
+                <a:ea typeface="Open Sans" pitchFamily="2" charset="0"/>
+                <a:cs typeface="Open Sans" pitchFamily="2" charset="0"/>
+              </a:rPr>
+              <a:t>  </a:t>
+            </a:r>
+          </a:p>
+          <a:p>
+            <a:pPr marL="0" indent="0">
+              <a:buNone/>
+            </a:pPr>
+            <a:r>
+              <a:rPr lang="en-US" sz="2400" b="1" dirty="0">
+                <a:latin typeface="Open Sans" pitchFamily="2" charset="0"/>
+                <a:ea typeface="Open Sans" pitchFamily="2" charset="0"/>
+                <a:cs typeface="Open Sans" pitchFamily="2" charset="0"/>
+              </a:rPr>
+              <a:t>So:</a:t>
+            </a:r>
+          </a:p>
+          <a:p>
+            <a:pPr lvl="1"/>
+            <a:r>
+              <a:rPr lang="en-US" sz="2200" dirty="0">
+                <a:latin typeface="Open Sans" pitchFamily="2" charset="0"/>
+                <a:ea typeface="Open Sans" pitchFamily="2" charset="0"/>
+                <a:cs typeface="Open Sans" pitchFamily="2" charset="0"/>
+              </a:rPr>
+              <a:t>Hash encoding prevents your dataset from becoming huge and slow.</a:t>
+            </a:r>
+          </a:p>
+          <a:p>
             <a:pPr marL="0" indent="0">
               <a:buNone/>
             </a:pPr>
@@ -10990,7 +9967,7 @@
     </p:spTree>
     <p:extLst>
       <p:ext uri="{BB962C8B-B14F-4D97-AF65-F5344CB8AC3E}">
-        <p14:creationId xmlns:p14="http://schemas.microsoft.com/office/powerpoint/2010/main" val="4230848076"/>
+        <p14:creationId xmlns:p14="http://schemas.microsoft.com/office/powerpoint/2010/main" val="3839561771"/>
       </p:ext>
     </p:extLst>
   </p:cSld>
@@ -11000,7 +9977,923 @@
 </p:sld>
 </file>
 
-<file path=ppt/slides/slide9.xml><?xml version="1.0" encoding="utf-8"?>
+<file path=ppt/slides/slide5.xml><?xml version="1.0" encoding="utf-8"?>
+<p:sld xmlns:a="http://schemas.openxmlformats.org/drawingml/2006/main" xmlns:r="http://schemas.openxmlformats.org/officeDocument/2006/relationships" xmlns:p="http://schemas.openxmlformats.org/presentationml/2006/main">
+  <p:cSld>
+    <p:spTree>
+      <p:nvGrpSpPr>
+        <p:cNvPr id="1" name="">
+          <a:extLst>
+            <a:ext uri="{FF2B5EF4-FFF2-40B4-BE49-F238E27FC236}">
+              <a16:creationId xmlns:a16="http://schemas.microsoft.com/office/drawing/2014/main" id="{7DBB6F7A-FEE6-9266-E7BF-B45BE1C61E7E}"/>
+            </a:ext>
+          </a:extLst>
+        </p:cNvPr>
+        <p:cNvGrpSpPr/>
+        <p:nvPr/>
+      </p:nvGrpSpPr>
+      <p:grpSpPr>
+        <a:xfrm>
+          <a:off x="0" y="0"/>
+          <a:ext cx="0" cy="0"/>
+          <a:chOff x="0" y="0"/>
+          <a:chExt cx="0" cy="0"/>
+        </a:xfrm>
+      </p:grpSpPr>
+      <p:sp>
+        <p:nvSpPr>
+          <p:cNvPr id="2" name="Title 1">
+            <a:extLst>
+              <a:ext uri="{FF2B5EF4-FFF2-40B4-BE49-F238E27FC236}">
+                <a16:creationId xmlns:a16="http://schemas.microsoft.com/office/drawing/2014/main" id="{36E00391-C2DD-6522-7FD4-E874D7B189C3}"/>
+              </a:ext>
+            </a:extLst>
+          </p:cNvPr>
+          <p:cNvSpPr>
+            <a:spLocks noGrp="1"/>
+          </p:cNvSpPr>
+          <p:nvPr>
+            <p:ph type="title"/>
+          </p:nvPr>
+        </p:nvSpPr>
+        <p:spPr>
+          <a:xfrm>
+            <a:off x="838200" y="365125"/>
+            <a:ext cx="10515600" cy="640080"/>
+          </a:xfrm>
+        </p:spPr>
+        <p:txBody>
+          <a:bodyPr>
+            <a:normAutofit/>
+          </a:bodyPr>
+          <a:lstStyle/>
+          <a:p>
+            <a:pPr algn="ctr"/>
+            <a:r>
+              <a:rPr lang="en-US" sz="3600" dirty="0">
+                <a:latin typeface="Bebas Neue" panose="020B0606020202050201" pitchFamily="34" charset="0"/>
+              </a:rPr>
+              <a:t>Importance of hash encoding</a:t>
+            </a:r>
+          </a:p>
+        </p:txBody>
+      </p:sp>
+      <p:sp>
+        <p:nvSpPr>
+          <p:cNvPr id="3" name="Content Placeholder 2">
+            <a:extLst>
+              <a:ext uri="{FF2B5EF4-FFF2-40B4-BE49-F238E27FC236}">
+                <a16:creationId xmlns:a16="http://schemas.microsoft.com/office/drawing/2014/main" id="{E110BAD7-D991-03D7-2F67-EDAA70E6FFFA}"/>
+              </a:ext>
+            </a:extLst>
+          </p:cNvPr>
+          <p:cNvSpPr>
+            <a:spLocks noGrp="1"/>
+          </p:cNvSpPr>
+          <p:nvPr>
+            <p:ph idx="1"/>
+          </p:nvPr>
+        </p:nvSpPr>
+        <p:spPr>
+          <a:xfrm>
+            <a:off x="838200" y="1091381"/>
+            <a:ext cx="10515600" cy="5085582"/>
+          </a:xfrm>
+        </p:spPr>
+        <p:txBody>
+          <a:bodyPr>
+            <a:noAutofit/>
+          </a:bodyPr>
+          <a:lstStyle/>
+          <a:p>
+            <a:pPr marL="457200" indent="-457200">
+              <a:buFont typeface="+mj-lt"/>
+              <a:buAutoNum type="arabicPeriod" startAt="2"/>
+            </a:pPr>
+            <a:r>
+              <a:rPr lang="en-US" sz="2400" b="1" dirty="0">
+                <a:latin typeface="Open Sans" pitchFamily="2" charset="0"/>
+                <a:ea typeface="Open Sans" pitchFamily="2" charset="0"/>
+                <a:cs typeface="Open Sans" pitchFamily="2" charset="0"/>
+              </a:rPr>
+              <a:t>No Need to “fit” — Good for Unseen/New Categories</a:t>
+            </a:r>
+          </a:p>
+          <a:p>
+            <a:pPr marL="0" indent="0">
+              <a:buNone/>
+            </a:pPr>
+            <a:r>
+              <a:rPr lang="en-US" sz="2600" dirty="0">
+                <a:latin typeface="Open Sans" pitchFamily="2" charset="0"/>
+                <a:ea typeface="Open Sans" pitchFamily="2" charset="0"/>
+                <a:cs typeface="Open Sans" pitchFamily="2" charset="0"/>
+              </a:rPr>
+              <a:t>Important point:</a:t>
+            </a:r>
+          </a:p>
+          <a:p>
+            <a:pPr marL="457200" lvl="1" indent="0">
+              <a:buNone/>
+            </a:pPr>
+            <a:r>
+              <a:rPr lang="en-US" sz="2200" b="1" dirty="0">
+                <a:latin typeface="Open Sans" pitchFamily="2" charset="0"/>
+                <a:ea typeface="Open Sans" pitchFamily="2" charset="0"/>
+                <a:cs typeface="Open Sans" pitchFamily="2" charset="0"/>
+              </a:rPr>
+              <a:t>✔ One-hot / Label / Binary need fitting</a:t>
+            </a:r>
+          </a:p>
+          <a:p>
+            <a:pPr marL="457200" lvl="1" indent="0">
+              <a:buNone/>
+            </a:pPr>
+            <a:r>
+              <a:rPr lang="en-US" sz="2200" dirty="0">
+                <a:latin typeface="Open Sans" pitchFamily="2" charset="0"/>
+                <a:ea typeface="Open Sans" pitchFamily="2" charset="0"/>
+                <a:cs typeface="Open Sans" pitchFamily="2" charset="0"/>
+              </a:rPr>
+              <a:t>You must know </a:t>
+            </a:r>
+            <a:r>
+              <a:rPr lang="en-US" sz="2200" b="1" dirty="0">
+                <a:latin typeface="Open Sans" pitchFamily="2" charset="0"/>
+                <a:ea typeface="Open Sans" pitchFamily="2" charset="0"/>
+                <a:cs typeface="Open Sans" pitchFamily="2" charset="0"/>
+              </a:rPr>
+              <a:t>all categories in advance</a:t>
+            </a:r>
+            <a:r>
+              <a:rPr lang="en-US" sz="2200" dirty="0">
+                <a:latin typeface="Open Sans" pitchFamily="2" charset="0"/>
+                <a:ea typeface="Open Sans" pitchFamily="2" charset="0"/>
+                <a:cs typeface="Open Sans" pitchFamily="2" charset="0"/>
+              </a:rPr>
+              <a:t>.</a:t>
+            </a:r>
+          </a:p>
+          <a:p>
+            <a:pPr marL="457200" lvl="1" indent="0">
+              <a:buNone/>
+            </a:pPr>
+            <a:r>
+              <a:rPr lang="en-US" sz="2200" b="1" dirty="0">
+                <a:latin typeface="Open Sans" pitchFamily="2" charset="0"/>
+                <a:ea typeface="Open Sans" pitchFamily="2" charset="0"/>
+                <a:cs typeface="Open Sans" pitchFamily="2" charset="0"/>
+              </a:rPr>
+              <a:t>✔ Hash Encoding does NOT need fitting</a:t>
+            </a:r>
+          </a:p>
+          <a:p>
+            <a:pPr marL="457200" lvl="1" indent="0">
+              <a:buNone/>
+            </a:pPr>
+            <a:r>
+              <a:rPr lang="en-US" sz="2200" dirty="0">
+                <a:latin typeface="Open Sans" pitchFamily="2" charset="0"/>
+                <a:ea typeface="Open Sans" pitchFamily="2" charset="0"/>
+                <a:cs typeface="Open Sans" pitchFamily="2" charset="0"/>
+              </a:rPr>
+              <a:t>New categories? No problem.</a:t>
+            </a:r>
+          </a:p>
+          <a:p>
+            <a:pPr marL="0" indent="0">
+              <a:buNone/>
+            </a:pPr>
+            <a:endParaRPr lang="en-US" sz="2400" dirty="0">
+              <a:latin typeface="Open Sans" pitchFamily="2" charset="0"/>
+              <a:ea typeface="Open Sans" pitchFamily="2" charset="0"/>
+              <a:cs typeface="Open Sans" pitchFamily="2" charset="0"/>
+            </a:endParaRPr>
+          </a:p>
+          <a:p>
+            <a:pPr marL="0" indent="0">
+              <a:buNone/>
+            </a:pPr>
+            <a:r>
+              <a:rPr lang="en-US" sz="2400" dirty="0">
+                <a:latin typeface="Open Sans" pitchFamily="2" charset="0"/>
+                <a:ea typeface="Open Sans" pitchFamily="2" charset="0"/>
+                <a:cs typeface="Open Sans" pitchFamily="2" charset="0"/>
+              </a:rPr>
+              <a:t>This is </a:t>
+            </a:r>
+            <a:r>
+              <a:rPr lang="en-US" sz="2400" b="1" dirty="0">
+                <a:latin typeface="Open Sans" pitchFamily="2" charset="0"/>
+                <a:ea typeface="Open Sans" pitchFamily="2" charset="0"/>
+                <a:cs typeface="Open Sans" pitchFamily="2" charset="0"/>
+              </a:rPr>
+              <a:t>very useful for streaming data</a:t>
+            </a:r>
+            <a:r>
+              <a:rPr lang="en-US" sz="2400" dirty="0">
+                <a:latin typeface="Open Sans" pitchFamily="2" charset="0"/>
+                <a:ea typeface="Open Sans" pitchFamily="2" charset="0"/>
+                <a:cs typeface="Open Sans" pitchFamily="2" charset="0"/>
+              </a:rPr>
+              <a:t>:</a:t>
+            </a:r>
+          </a:p>
+          <a:p>
+            <a:pPr lvl="1"/>
+            <a:r>
+              <a:rPr lang="en-US" sz="2200" dirty="0">
+                <a:latin typeface="Open Sans" pitchFamily="2" charset="0"/>
+                <a:ea typeface="Open Sans" pitchFamily="2" charset="0"/>
+                <a:cs typeface="Open Sans" pitchFamily="2" charset="0"/>
+              </a:rPr>
+              <a:t>live logs</a:t>
+            </a:r>
+          </a:p>
+          <a:p>
+            <a:pPr lvl="1"/>
+            <a:r>
+              <a:rPr lang="en-US" sz="2200" dirty="0">
+                <a:latin typeface="Open Sans" pitchFamily="2" charset="0"/>
+                <a:ea typeface="Open Sans" pitchFamily="2" charset="0"/>
+                <a:cs typeface="Open Sans" pitchFamily="2" charset="0"/>
+              </a:rPr>
+              <a:t>real-time user events </a:t>
+            </a:r>
+          </a:p>
+          <a:p>
+            <a:pPr lvl="1"/>
+            <a:r>
+              <a:rPr lang="en-US" sz="2200" dirty="0">
+                <a:latin typeface="Open Sans" pitchFamily="2" charset="0"/>
+                <a:ea typeface="Open Sans" pitchFamily="2" charset="0"/>
+                <a:cs typeface="Open Sans" pitchFamily="2" charset="0"/>
+              </a:rPr>
+              <a:t>new products being added daily (e-commerce)</a:t>
+            </a:r>
+          </a:p>
+          <a:p>
+            <a:pPr marL="0" indent="0">
+              <a:buNone/>
+            </a:pPr>
+            <a:endParaRPr lang="en-US" sz="2400" dirty="0">
+              <a:latin typeface="Open Sans" pitchFamily="2" charset="0"/>
+              <a:ea typeface="Open Sans" pitchFamily="2" charset="0"/>
+              <a:cs typeface="Open Sans" pitchFamily="2" charset="0"/>
+            </a:endParaRPr>
+          </a:p>
+        </p:txBody>
+      </p:sp>
+      <p:sp>
+        <p:nvSpPr>
+          <p:cNvPr id="4" name="Rectangle 3">
+            <a:extLst>
+              <a:ext uri="{FF2B5EF4-FFF2-40B4-BE49-F238E27FC236}">
+                <a16:creationId xmlns:a16="http://schemas.microsoft.com/office/drawing/2014/main" id="{402D5E0E-BBD2-0522-886B-2FE932911748}"/>
+              </a:ext>
+            </a:extLst>
+          </p:cNvPr>
+          <p:cNvSpPr/>
+          <p:nvPr/>
+        </p:nvSpPr>
+        <p:spPr>
+          <a:xfrm>
+            <a:off x="7167282" y="1976718"/>
+            <a:ext cx="3751729" cy="1191295"/>
+          </a:xfrm>
+          <a:prstGeom prst="rect">
+            <a:avLst/>
+          </a:prstGeom>
+        </p:spPr>
+        <p:style>
+          <a:lnRef idx="1">
+            <a:schemeClr val="accent5"/>
+          </a:lnRef>
+          <a:fillRef idx="3">
+            <a:schemeClr val="accent5"/>
+          </a:fillRef>
+          <a:effectRef idx="2">
+            <a:schemeClr val="accent5"/>
+          </a:effectRef>
+          <a:fontRef idx="minor">
+            <a:schemeClr val="lt1"/>
+          </a:fontRef>
+        </p:style>
+        <p:txBody>
+          <a:bodyPr rtlCol="0" anchor="ctr"/>
+          <a:lstStyle/>
+          <a:p>
+            <a:r>
+              <a:rPr lang="en-US" sz="2200" dirty="0">
+                <a:latin typeface="Open Sans" pitchFamily="2" charset="0"/>
+                <a:ea typeface="Open Sans" pitchFamily="2" charset="0"/>
+                <a:cs typeface="Open Sans" pitchFamily="2" charset="0"/>
+              </a:rPr>
+              <a:t>"dragonfruit" → hashed</a:t>
+            </a:r>
+          </a:p>
+          <a:p>
+            <a:r>
+              <a:rPr lang="en-US" sz="2200" dirty="0">
+                <a:latin typeface="Open Sans" pitchFamily="2" charset="0"/>
+                <a:ea typeface="Open Sans" pitchFamily="2" charset="0"/>
+                <a:cs typeface="Open Sans" pitchFamily="2" charset="0"/>
+              </a:rPr>
+              <a:t>"kiwi"        → hashed</a:t>
+            </a:r>
+          </a:p>
+          <a:p>
+            <a:r>
+              <a:rPr lang="en-US" sz="2200" dirty="0">
+                <a:latin typeface="Open Sans" pitchFamily="2" charset="0"/>
+                <a:ea typeface="Open Sans" pitchFamily="2" charset="0"/>
+                <a:cs typeface="Open Sans" pitchFamily="2" charset="0"/>
+              </a:rPr>
+              <a:t>"unknown123"  → hashed</a:t>
+            </a:r>
+            <a:endParaRPr lang="en-US" sz="2200" dirty="0">
+              <a:effectLst/>
+              <a:latin typeface="Open Sans" pitchFamily="2" charset="0"/>
+              <a:ea typeface="Open Sans" pitchFamily="2" charset="0"/>
+              <a:cs typeface="Open Sans" pitchFamily="2" charset="0"/>
+            </a:endParaRPr>
+          </a:p>
+        </p:txBody>
+      </p:sp>
+      <p:sp>
+        <p:nvSpPr>
+          <p:cNvPr id="5" name="Rectangle 4">
+            <a:extLst>
+              <a:ext uri="{FF2B5EF4-FFF2-40B4-BE49-F238E27FC236}">
+                <a16:creationId xmlns:a16="http://schemas.microsoft.com/office/drawing/2014/main" id="{95EF0798-971A-E1DF-08CC-1CFBA3AE9A7D}"/>
+              </a:ext>
+            </a:extLst>
+          </p:cNvPr>
+          <p:cNvSpPr/>
+          <p:nvPr/>
+        </p:nvSpPr>
+        <p:spPr>
+          <a:xfrm>
+            <a:off x="7167282" y="3168013"/>
+            <a:ext cx="3751729" cy="799160"/>
+          </a:xfrm>
+          <a:prstGeom prst="rect">
+            <a:avLst/>
+          </a:prstGeom>
+        </p:spPr>
+        <p:style>
+          <a:lnRef idx="2">
+            <a:schemeClr val="accent1"/>
+          </a:lnRef>
+          <a:fillRef idx="1">
+            <a:schemeClr val="lt1"/>
+          </a:fillRef>
+          <a:effectRef idx="0">
+            <a:schemeClr val="accent1"/>
+          </a:effectRef>
+          <a:fontRef idx="minor">
+            <a:schemeClr val="dk1"/>
+          </a:fontRef>
+        </p:style>
+        <p:txBody>
+          <a:bodyPr rtlCol="0" anchor="ctr"/>
+          <a:lstStyle/>
+          <a:p>
+            <a:r>
+              <a:rPr lang="en-US" sz="2200" dirty="0">
+                <a:latin typeface="Open Sans" pitchFamily="2" charset="0"/>
+                <a:ea typeface="Open Sans" pitchFamily="2" charset="0"/>
+                <a:cs typeface="Open Sans" pitchFamily="2" charset="0"/>
+              </a:rPr>
+              <a:t>No errors. No refit. No update.</a:t>
+            </a:r>
+          </a:p>
+        </p:txBody>
+      </p:sp>
+    </p:spTree>
+    <p:extLst>
+      <p:ext uri="{BB962C8B-B14F-4D97-AF65-F5344CB8AC3E}">
+        <p14:creationId xmlns:p14="http://schemas.microsoft.com/office/powerpoint/2010/main" val="41421681"/>
+      </p:ext>
+    </p:extLst>
+  </p:cSld>
+  <p:clrMapOvr>
+    <a:masterClrMapping/>
+  </p:clrMapOvr>
+</p:sld>
+</file>
+
+<file path=ppt/slides/slide6.xml><?xml version="1.0" encoding="utf-8"?>
+<p:sld xmlns:a="http://schemas.openxmlformats.org/drawingml/2006/main" xmlns:r="http://schemas.openxmlformats.org/officeDocument/2006/relationships" xmlns:p="http://schemas.openxmlformats.org/presentationml/2006/main">
+  <p:cSld>
+    <p:spTree>
+      <p:nvGrpSpPr>
+        <p:cNvPr id="1" name="">
+          <a:extLst>
+            <a:ext uri="{FF2B5EF4-FFF2-40B4-BE49-F238E27FC236}">
+              <a16:creationId xmlns:a16="http://schemas.microsoft.com/office/drawing/2014/main" id="{A3E6B0A9-8E92-6816-3EB2-0B15207BF6CC}"/>
+            </a:ext>
+          </a:extLst>
+        </p:cNvPr>
+        <p:cNvGrpSpPr/>
+        <p:nvPr/>
+      </p:nvGrpSpPr>
+      <p:grpSpPr>
+        <a:xfrm>
+          <a:off x="0" y="0"/>
+          <a:ext cx="0" cy="0"/>
+          <a:chOff x="0" y="0"/>
+          <a:chExt cx="0" cy="0"/>
+        </a:xfrm>
+      </p:grpSpPr>
+      <p:sp>
+        <p:nvSpPr>
+          <p:cNvPr id="2" name="Title 1">
+            <a:extLst>
+              <a:ext uri="{FF2B5EF4-FFF2-40B4-BE49-F238E27FC236}">
+                <a16:creationId xmlns:a16="http://schemas.microsoft.com/office/drawing/2014/main" id="{749785D5-4E37-6303-E57F-36CEB1E50002}"/>
+              </a:ext>
+            </a:extLst>
+          </p:cNvPr>
+          <p:cNvSpPr>
+            <a:spLocks noGrp="1"/>
+          </p:cNvSpPr>
+          <p:nvPr>
+            <p:ph type="title"/>
+          </p:nvPr>
+        </p:nvSpPr>
+        <p:spPr>
+          <a:xfrm>
+            <a:off x="838200" y="365125"/>
+            <a:ext cx="10515600" cy="640080"/>
+          </a:xfrm>
+        </p:spPr>
+        <p:txBody>
+          <a:bodyPr>
+            <a:normAutofit/>
+          </a:bodyPr>
+          <a:lstStyle/>
+          <a:p>
+            <a:pPr algn="ctr"/>
+            <a:r>
+              <a:rPr lang="en-US" sz="3600" dirty="0">
+                <a:latin typeface="Bebas Neue" panose="020B0606020202050201" pitchFamily="34" charset="0"/>
+              </a:rPr>
+              <a:t>Importance of hash encoding</a:t>
+            </a:r>
+          </a:p>
+        </p:txBody>
+      </p:sp>
+      <p:sp>
+        <p:nvSpPr>
+          <p:cNvPr id="3" name="Content Placeholder 2">
+            <a:extLst>
+              <a:ext uri="{FF2B5EF4-FFF2-40B4-BE49-F238E27FC236}">
+                <a16:creationId xmlns:a16="http://schemas.microsoft.com/office/drawing/2014/main" id="{246138B8-5C6A-E853-A761-1F6DE52AC7C9}"/>
+              </a:ext>
+            </a:extLst>
+          </p:cNvPr>
+          <p:cNvSpPr>
+            <a:spLocks noGrp="1"/>
+          </p:cNvSpPr>
+          <p:nvPr>
+            <p:ph idx="1"/>
+          </p:nvPr>
+        </p:nvSpPr>
+        <p:spPr>
+          <a:xfrm>
+            <a:off x="838200" y="1091381"/>
+            <a:ext cx="10515600" cy="5085582"/>
+          </a:xfrm>
+        </p:spPr>
+        <p:txBody>
+          <a:bodyPr>
+            <a:normAutofit/>
+          </a:bodyPr>
+          <a:lstStyle/>
+          <a:p>
+            <a:pPr marL="457200" indent="-457200">
+              <a:buFont typeface="+mj-lt"/>
+              <a:buAutoNum type="arabicPeriod" startAt="3"/>
+            </a:pPr>
+            <a:r>
+              <a:rPr lang="en-US" sz="2400" b="1" dirty="0">
+                <a:latin typeface="Open Sans" pitchFamily="2" charset="0"/>
+                <a:ea typeface="Open Sans" pitchFamily="2" charset="0"/>
+                <a:cs typeface="Open Sans" pitchFamily="2" charset="0"/>
+              </a:rPr>
+              <a:t>Saves Memory + Fast</a:t>
+            </a:r>
+          </a:p>
+          <a:p>
+            <a:pPr marL="0" indent="0">
+              <a:buNone/>
+            </a:pPr>
+            <a:r>
+              <a:rPr lang="en-US" sz="2400" dirty="0">
+                <a:latin typeface="Open Sans" pitchFamily="2" charset="0"/>
+                <a:ea typeface="Open Sans" pitchFamily="2" charset="0"/>
+                <a:cs typeface="Open Sans" pitchFamily="2" charset="0"/>
+              </a:rPr>
+              <a:t>Hash encoding does </a:t>
+            </a:r>
+            <a:r>
+              <a:rPr lang="en-US" sz="2400" b="1" dirty="0">
+                <a:latin typeface="Open Sans" pitchFamily="2" charset="0"/>
+                <a:ea typeface="Open Sans" pitchFamily="2" charset="0"/>
+                <a:cs typeface="Open Sans" pitchFamily="2" charset="0"/>
+              </a:rPr>
+              <a:t>not</a:t>
+            </a:r>
+            <a:r>
+              <a:rPr lang="en-US" sz="2400" dirty="0">
+                <a:latin typeface="Open Sans" pitchFamily="2" charset="0"/>
+                <a:ea typeface="Open Sans" pitchFamily="2" charset="0"/>
+                <a:cs typeface="Open Sans" pitchFamily="2" charset="0"/>
+              </a:rPr>
+              <a:t> store a lookup table. It uses a mathematical hash function.</a:t>
+            </a:r>
+          </a:p>
+          <a:p>
+            <a:pPr marL="0" indent="0">
+              <a:buNone/>
+            </a:pPr>
+            <a:r>
+              <a:rPr lang="en-US" sz="2400" b="1" dirty="0">
+                <a:latin typeface="Open Sans" pitchFamily="2" charset="0"/>
+                <a:ea typeface="Open Sans" pitchFamily="2" charset="0"/>
+                <a:cs typeface="Open Sans" pitchFamily="2" charset="0"/>
+              </a:rPr>
+              <a:t>This saves:</a:t>
+            </a:r>
+          </a:p>
+          <a:p>
+            <a:pPr lvl="1"/>
+            <a:r>
+              <a:rPr lang="en-US" sz="2200" dirty="0">
+                <a:latin typeface="Open Sans" pitchFamily="2" charset="0"/>
+                <a:ea typeface="Open Sans" pitchFamily="2" charset="0"/>
+                <a:cs typeface="Open Sans" pitchFamily="2" charset="0"/>
+              </a:rPr>
+              <a:t>RAM</a:t>
+            </a:r>
+          </a:p>
+          <a:p>
+            <a:pPr lvl="1"/>
+            <a:r>
+              <a:rPr lang="en-US" sz="2200" dirty="0">
+                <a:latin typeface="Open Sans" pitchFamily="2" charset="0"/>
+                <a:ea typeface="Open Sans" pitchFamily="2" charset="0"/>
+                <a:cs typeface="Open Sans" pitchFamily="2" charset="0"/>
+              </a:rPr>
+              <a:t>storage</a:t>
+            </a:r>
+          </a:p>
+          <a:p>
+            <a:pPr lvl="1"/>
+            <a:r>
+              <a:rPr lang="en-US" sz="2200" dirty="0">
+                <a:latin typeface="Open Sans" pitchFamily="2" charset="0"/>
+                <a:ea typeface="Open Sans" pitchFamily="2" charset="0"/>
+                <a:cs typeface="Open Sans" pitchFamily="2" charset="0"/>
+              </a:rPr>
+              <a:t>time</a:t>
+            </a:r>
+          </a:p>
+          <a:p>
+            <a:pPr marL="0" indent="0">
+              <a:buNone/>
+            </a:pPr>
+            <a:r>
+              <a:rPr lang="en-US" sz="2400" dirty="0">
+                <a:latin typeface="Open Sans" pitchFamily="2" charset="0"/>
+                <a:ea typeface="Open Sans" pitchFamily="2" charset="0"/>
+                <a:cs typeface="Open Sans" pitchFamily="2" charset="0"/>
+              </a:rPr>
+              <a:t>And because column count stays small, models train </a:t>
+            </a:r>
+            <a:r>
+              <a:rPr lang="en-US" sz="2400" b="1" dirty="0">
+                <a:latin typeface="Open Sans" pitchFamily="2" charset="0"/>
+                <a:ea typeface="Open Sans" pitchFamily="2" charset="0"/>
+                <a:cs typeface="Open Sans" pitchFamily="2" charset="0"/>
+              </a:rPr>
+              <a:t>much faster</a:t>
+            </a:r>
+            <a:r>
+              <a:rPr lang="en-US" sz="2400" dirty="0">
+                <a:latin typeface="Open Sans" pitchFamily="2" charset="0"/>
+                <a:ea typeface="Open Sans" pitchFamily="2" charset="0"/>
+                <a:cs typeface="Open Sans" pitchFamily="2" charset="0"/>
+              </a:rPr>
+              <a:t>.</a:t>
+            </a:r>
+          </a:p>
+          <a:p>
+            <a:pPr marL="0" indent="0">
+              <a:buNone/>
+            </a:pPr>
+            <a:endParaRPr lang="en-US" sz="2400" dirty="0">
+              <a:latin typeface="Open Sans" pitchFamily="2" charset="0"/>
+              <a:ea typeface="Open Sans" pitchFamily="2" charset="0"/>
+              <a:cs typeface="Open Sans" pitchFamily="2" charset="0"/>
+            </a:endParaRPr>
+          </a:p>
+        </p:txBody>
+      </p:sp>
+    </p:spTree>
+    <p:extLst>
+      <p:ext uri="{BB962C8B-B14F-4D97-AF65-F5344CB8AC3E}">
+        <p14:creationId xmlns:p14="http://schemas.microsoft.com/office/powerpoint/2010/main" val="1946900617"/>
+      </p:ext>
+    </p:extLst>
+  </p:cSld>
+  <p:clrMapOvr>
+    <a:masterClrMapping/>
+  </p:clrMapOvr>
+</p:sld>
+</file>
+
+<file path=ppt/slides/slide7.xml><?xml version="1.0" encoding="utf-8"?>
+<p:sld xmlns:a="http://schemas.openxmlformats.org/drawingml/2006/main" xmlns:r="http://schemas.openxmlformats.org/officeDocument/2006/relationships" xmlns:p="http://schemas.openxmlformats.org/presentationml/2006/main">
+  <p:cSld>
+    <p:spTree>
+      <p:nvGrpSpPr>
+        <p:cNvPr id="1" name="">
+          <a:extLst>
+            <a:ext uri="{FF2B5EF4-FFF2-40B4-BE49-F238E27FC236}">
+              <a16:creationId xmlns:a16="http://schemas.microsoft.com/office/drawing/2014/main" id="{5C042334-0CF6-2B36-F9FA-E3588B094FD7}"/>
+            </a:ext>
+          </a:extLst>
+        </p:cNvPr>
+        <p:cNvGrpSpPr/>
+        <p:nvPr/>
+      </p:nvGrpSpPr>
+      <p:grpSpPr>
+        <a:xfrm>
+          <a:off x="0" y="0"/>
+          <a:ext cx="0" cy="0"/>
+          <a:chOff x="0" y="0"/>
+          <a:chExt cx="0" cy="0"/>
+        </a:xfrm>
+      </p:grpSpPr>
+      <p:sp>
+        <p:nvSpPr>
+          <p:cNvPr id="2" name="Title 1">
+            <a:extLst>
+              <a:ext uri="{FF2B5EF4-FFF2-40B4-BE49-F238E27FC236}">
+                <a16:creationId xmlns:a16="http://schemas.microsoft.com/office/drawing/2014/main" id="{60EE7321-F965-DF72-917D-87042A627436}"/>
+              </a:ext>
+            </a:extLst>
+          </p:cNvPr>
+          <p:cNvSpPr>
+            <a:spLocks noGrp="1"/>
+          </p:cNvSpPr>
+          <p:nvPr>
+            <p:ph type="title"/>
+          </p:nvPr>
+        </p:nvSpPr>
+        <p:spPr>
+          <a:xfrm>
+            <a:off x="838200" y="365125"/>
+            <a:ext cx="10515600" cy="640080"/>
+          </a:xfrm>
+        </p:spPr>
+        <p:txBody>
+          <a:bodyPr>
+            <a:normAutofit/>
+          </a:bodyPr>
+          <a:lstStyle/>
+          <a:p>
+            <a:pPr algn="ctr"/>
+            <a:r>
+              <a:rPr lang="en-US" sz="3600" dirty="0">
+                <a:latin typeface="Bebas Neue" panose="020B0606020202050201" pitchFamily="34" charset="0"/>
+              </a:rPr>
+              <a:t>Importance of hash encoding</a:t>
+            </a:r>
+          </a:p>
+        </p:txBody>
+      </p:sp>
+      <p:sp>
+        <p:nvSpPr>
+          <p:cNvPr id="3" name="Content Placeholder 2">
+            <a:extLst>
+              <a:ext uri="{FF2B5EF4-FFF2-40B4-BE49-F238E27FC236}">
+                <a16:creationId xmlns:a16="http://schemas.microsoft.com/office/drawing/2014/main" id="{12E7334B-60AF-1204-6FC7-48BD740096D7}"/>
+              </a:ext>
+            </a:extLst>
+          </p:cNvPr>
+          <p:cNvSpPr>
+            <a:spLocks noGrp="1"/>
+          </p:cNvSpPr>
+          <p:nvPr>
+            <p:ph idx="1"/>
+          </p:nvPr>
+        </p:nvSpPr>
+        <p:spPr>
+          <a:xfrm>
+            <a:off x="838200" y="1091381"/>
+            <a:ext cx="10515600" cy="5085582"/>
+          </a:xfrm>
+        </p:spPr>
+        <p:txBody>
+          <a:bodyPr>
+            <a:normAutofit lnSpcReduction="10000"/>
+          </a:bodyPr>
+          <a:lstStyle/>
+          <a:p>
+            <a:pPr marL="457200" indent="-457200">
+              <a:buFont typeface="+mj-lt"/>
+              <a:buAutoNum type="arabicPeriod" startAt="4"/>
+            </a:pPr>
+            <a:r>
+              <a:rPr lang="en-US" sz="2400" b="1" dirty="0">
+                <a:latin typeface="Open Sans" pitchFamily="2" charset="0"/>
+                <a:ea typeface="Open Sans" pitchFamily="2" charset="0"/>
+                <a:cs typeface="Open Sans" pitchFamily="2" charset="0"/>
+              </a:rPr>
+              <a:t>Reduces Multicollinearity (better than One-Hot)</a:t>
+            </a:r>
+          </a:p>
+          <a:p>
+            <a:pPr marL="0" indent="0">
+              <a:buNone/>
+            </a:pPr>
+            <a:r>
+              <a:rPr lang="en-US" sz="2400" dirty="0">
+                <a:latin typeface="Open Sans" pitchFamily="2" charset="0"/>
+                <a:ea typeface="Open Sans" pitchFamily="2" charset="0"/>
+                <a:cs typeface="Open Sans" pitchFamily="2" charset="0"/>
+              </a:rPr>
+              <a:t>One-hot encoding creates </a:t>
+            </a:r>
+            <a:r>
+              <a:rPr lang="en-US" sz="2400" b="1" dirty="0">
+                <a:latin typeface="Open Sans" pitchFamily="2" charset="0"/>
+                <a:ea typeface="Open Sans" pitchFamily="2" charset="0"/>
+                <a:cs typeface="Open Sans" pitchFamily="2" charset="0"/>
+              </a:rPr>
+              <a:t>highly correlated</a:t>
+            </a:r>
+            <a:r>
+              <a:rPr lang="en-US" sz="2400" dirty="0">
+                <a:latin typeface="Open Sans" pitchFamily="2" charset="0"/>
+                <a:ea typeface="Open Sans" pitchFamily="2" charset="0"/>
+                <a:cs typeface="Open Sans" pitchFamily="2" charset="0"/>
+              </a:rPr>
+              <a:t> dummy columns.</a:t>
+            </a:r>
+          </a:p>
+          <a:p>
+            <a:pPr marL="0" indent="0">
+              <a:buNone/>
+            </a:pPr>
+            <a:r>
+              <a:rPr lang="en-US" sz="2400" b="1" dirty="0">
+                <a:latin typeface="Open Sans" pitchFamily="2" charset="0"/>
+                <a:ea typeface="Open Sans" pitchFamily="2" charset="0"/>
+                <a:cs typeface="Open Sans" pitchFamily="2" charset="0"/>
+              </a:rPr>
+              <a:t>Hash encoding:</a:t>
+            </a:r>
+          </a:p>
+          <a:p>
+            <a:pPr lvl="1"/>
+            <a:r>
+              <a:rPr lang="en-US" sz="2200" dirty="0">
+                <a:latin typeface="Open Sans" pitchFamily="2" charset="0"/>
+                <a:ea typeface="Open Sans" pitchFamily="2" charset="0"/>
+                <a:cs typeface="Open Sans" pitchFamily="2" charset="0"/>
+              </a:rPr>
+              <a:t>spreads categories across multiple columns</a:t>
+            </a:r>
+          </a:p>
+          <a:p>
+            <a:pPr lvl="1"/>
+            <a:r>
+              <a:rPr lang="en-US" sz="2200" dirty="0">
+                <a:latin typeface="Open Sans" pitchFamily="2" charset="0"/>
+                <a:ea typeface="Open Sans" pitchFamily="2" charset="0"/>
+                <a:cs typeface="Open Sans" pitchFamily="2" charset="0"/>
+              </a:rPr>
+              <a:t>collisions and ±1 signs reduce correlation</a:t>
+            </a:r>
+          </a:p>
+          <a:p>
+            <a:pPr lvl="1"/>
+            <a:r>
+              <a:rPr lang="en-US" sz="2200" dirty="0">
+                <a:latin typeface="Open Sans" pitchFamily="2" charset="0"/>
+                <a:ea typeface="Open Sans" pitchFamily="2" charset="0"/>
+                <a:cs typeface="Open Sans" pitchFamily="2" charset="0"/>
+              </a:rPr>
+              <a:t>reduces overfitting risk</a:t>
+            </a:r>
+          </a:p>
+          <a:p>
+            <a:pPr marL="0" indent="0">
+              <a:buNone/>
+            </a:pPr>
+            <a:r>
+              <a:rPr lang="en-US" sz="2400" b="1" dirty="0">
+                <a:latin typeface="Open Sans" pitchFamily="2" charset="0"/>
+                <a:ea typeface="Open Sans" pitchFamily="2" charset="0"/>
+                <a:cs typeface="Open Sans" pitchFamily="2" charset="0"/>
+              </a:rPr>
+              <a:t>This makes some models happier:</a:t>
+            </a:r>
+          </a:p>
+          <a:p>
+            <a:pPr lvl="1"/>
+            <a:r>
+              <a:rPr lang="en-US" sz="2200" dirty="0">
+                <a:latin typeface="Open Sans" pitchFamily="2" charset="0"/>
+                <a:ea typeface="Open Sans" pitchFamily="2" charset="0"/>
+                <a:cs typeface="Open Sans" pitchFamily="2" charset="0"/>
+              </a:rPr>
+              <a:t>Logistic Regression</a:t>
+            </a:r>
+          </a:p>
+          <a:p>
+            <a:pPr lvl="1"/>
+            <a:r>
+              <a:rPr lang="en-US" sz="2200" dirty="0">
+                <a:latin typeface="Open Sans" pitchFamily="2" charset="0"/>
+                <a:ea typeface="Open Sans" pitchFamily="2" charset="0"/>
+                <a:cs typeface="Open Sans" pitchFamily="2" charset="0"/>
+              </a:rPr>
+              <a:t>Linear Regression</a:t>
+            </a:r>
+          </a:p>
+          <a:p>
+            <a:pPr lvl="1"/>
+            <a:r>
+              <a:rPr lang="en-US" sz="2200" dirty="0" err="1">
+                <a:latin typeface="Open Sans" pitchFamily="2" charset="0"/>
+                <a:ea typeface="Open Sans" pitchFamily="2" charset="0"/>
+                <a:cs typeface="Open Sans" pitchFamily="2" charset="0"/>
+              </a:rPr>
+              <a:t>SVM</a:t>
+            </a:r>
+            <a:endParaRPr lang="en-US" sz="2200" dirty="0">
+              <a:latin typeface="Open Sans" pitchFamily="2" charset="0"/>
+              <a:ea typeface="Open Sans" pitchFamily="2" charset="0"/>
+              <a:cs typeface="Open Sans" pitchFamily="2" charset="0"/>
+            </a:endParaRPr>
+          </a:p>
+          <a:p>
+            <a:pPr lvl="1"/>
+            <a:endParaRPr lang="en-US" sz="2200" dirty="0">
+              <a:latin typeface="Open Sans" pitchFamily="2" charset="0"/>
+              <a:ea typeface="Open Sans" pitchFamily="2" charset="0"/>
+              <a:cs typeface="Open Sans" pitchFamily="2" charset="0"/>
+            </a:endParaRPr>
+          </a:p>
+          <a:p>
+            <a:pPr marL="0" indent="0">
+              <a:buNone/>
+            </a:pPr>
+            <a:r>
+              <a:rPr lang="en-US" sz="2400" b="1" dirty="0">
+                <a:latin typeface="Open Sans" pitchFamily="2" charset="0"/>
+                <a:ea typeface="Open Sans" pitchFamily="2" charset="0"/>
+                <a:cs typeface="Open Sans" pitchFamily="2" charset="0"/>
+              </a:rPr>
+              <a:t>In one line, Hash Encoding is important because it makes huge categorical data manageable, fast, memory-efficient, and able to handle new categories without retraining.</a:t>
+            </a:r>
+            <a:endParaRPr lang="en-US" sz="2400" dirty="0">
+              <a:latin typeface="Open Sans" pitchFamily="2" charset="0"/>
+              <a:ea typeface="Open Sans" pitchFamily="2" charset="0"/>
+              <a:cs typeface="Open Sans" pitchFamily="2" charset="0"/>
+            </a:endParaRPr>
+          </a:p>
+          <a:p>
+            <a:pPr marL="0" indent="0">
+              <a:buNone/>
+            </a:pPr>
+            <a:endParaRPr lang="en-US" sz="2600" dirty="0">
+              <a:latin typeface="Open Sans" pitchFamily="2" charset="0"/>
+              <a:ea typeface="Open Sans" pitchFamily="2" charset="0"/>
+              <a:cs typeface="Open Sans" pitchFamily="2" charset="0"/>
+            </a:endParaRPr>
+          </a:p>
+        </p:txBody>
+      </p:sp>
+    </p:spTree>
+    <p:extLst>
+      <p:ext uri="{BB962C8B-B14F-4D97-AF65-F5344CB8AC3E}">
+        <p14:creationId xmlns:p14="http://schemas.microsoft.com/office/powerpoint/2010/main" val="2317169321"/>
+      </p:ext>
+    </p:extLst>
+  </p:cSld>
+  <p:clrMapOvr>
+    <a:masterClrMapping/>
+  </p:clrMapOvr>
+</p:sld>
+</file>
+
+<file path=ppt/slides/slide8.xml><?xml version="1.0" encoding="utf-8"?>
 <p:sld xmlns:a="http://schemas.openxmlformats.org/drawingml/2006/main" xmlns:r="http://schemas.openxmlformats.org/officeDocument/2006/relationships" xmlns:p="http://schemas.openxmlformats.org/presentationml/2006/main">
   <p:cSld>
     <p:spTree>

</xml_diff>